<commit_message>
docs, config easy setup
</commit_message>
<xml_diff>
--- a/aws_sra_examples/solutions/shield_advanced/shield_advanced/documentation/shield.pptx
+++ b/aws_sra_examples/solutions/shield_advanced/shield_advanced/documentation/shield.pptx
@@ -197,7 +197,7 @@
           <a:p>
             <a:fld id="{FD8D84E3-00BA-4A46-8256-7E527D8B4480}" type="datetimeFigureOut">
               <a:rPr lang="en-US" smtClean="0"/>
-              <a:t>1/18/24</a:t>
+              <a:t>2/8/24</a:t>
             </a:fld>
             <a:endParaRPr lang="en-US"/>
           </a:p>
@@ -695,7 +695,7 @@
           <a:p>
             <a:fld id="{9FE185F7-9B28-9F45-9F43-9CB5A0B99390}" type="datetimeFigureOut">
               <a:rPr lang="en-US" smtClean="0"/>
-              <a:t>1/18/24</a:t>
+              <a:t>2/8/24</a:t>
             </a:fld>
             <a:endParaRPr lang="en-US"/>
           </a:p>
@@ -893,7 +893,7 @@
           <a:p>
             <a:fld id="{9FE185F7-9B28-9F45-9F43-9CB5A0B99390}" type="datetimeFigureOut">
               <a:rPr lang="en-US" smtClean="0"/>
-              <a:t>1/18/24</a:t>
+              <a:t>2/8/24</a:t>
             </a:fld>
             <a:endParaRPr lang="en-US"/>
           </a:p>
@@ -1101,7 +1101,7 @@
           <a:p>
             <a:fld id="{9FE185F7-9B28-9F45-9F43-9CB5A0B99390}" type="datetimeFigureOut">
               <a:rPr lang="en-US" smtClean="0"/>
-              <a:t>1/18/24</a:t>
+              <a:t>2/8/24</a:t>
             </a:fld>
             <a:endParaRPr lang="en-US"/>
           </a:p>
@@ -1299,7 +1299,7 @@
           <a:p>
             <a:fld id="{9FE185F7-9B28-9F45-9F43-9CB5A0B99390}" type="datetimeFigureOut">
               <a:rPr lang="en-US" smtClean="0"/>
-              <a:t>1/18/24</a:t>
+              <a:t>2/8/24</a:t>
             </a:fld>
             <a:endParaRPr lang="en-US"/>
           </a:p>
@@ -1574,7 +1574,7 @@
           <a:p>
             <a:fld id="{9FE185F7-9B28-9F45-9F43-9CB5A0B99390}" type="datetimeFigureOut">
               <a:rPr lang="en-US" smtClean="0"/>
-              <a:t>1/18/24</a:t>
+              <a:t>2/8/24</a:t>
             </a:fld>
             <a:endParaRPr lang="en-US"/>
           </a:p>
@@ -1839,7 +1839,7 @@
           <a:p>
             <a:fld id="{9FE185F7-9B28-9F45-9F43-9CB5A0B99390}" type="datetimeFigureOut">
               <a:rPr lang="en-US" smtClean="0"/>
-              <a:t>1/18/24</a:t>
+              <a:t>2/8/24</a:t>
             </a:fld>
             <a:endParaRPr lang="en-US"/>
           </a:p>
@@ -2251,7 +2251,7 @@
           <a:p>
             <a:fld id="{9FE185F7-9B28-9F45-9F43-9CB5A0B99390}" type="datetimeFigureOut">
               <a:rPr lang="en-US" smtClean="0"/>
-              <a:t>1/18/24</a:t>
+              <a:t>2/8/24</a:t>
             </a:fld>
             <a:endParaRPr lang="en-US"/>
           </a:p>
@@ -2392,7 +2392,7 @@
           <a:p>
             <a:fld id="{9FE185F7-9B28-9F45-9F43-9CB5A0B99390}" type="datetimeFigureOut">
               <a:rPr lang="en-US" smtClean="0"/>
-              <a:t>1/18/24</a:t>
+              <a:t>2/8/24</a:t>
             </a:fld>
             <a:endParaRPr lang="en-US"/>
           </a:p>
@@ -2505,7 +2505,7 @@
           <a:p>
             <a:fld id="{9FE185F7-9B28-9F45-9F43-9CB5A0B99390}" type="datetimeFigureOut">
               <a:rPr lang="en-US" smtClean="0"/>
-              <a:t>1/18/24</a:t>
+              <a:t>2/8/24</a:t>
             </a:fld>
             <a:endParaRPr lang="en-US"/>
           </a:p>
@@ -2816,7 +2816,7 @@
           <a:p>
             <a:fld id="{9FE185F7-9B28-9F45-9F43-9CB5A0B99390}" type="datetimeFigureOut">
               <a:rPr lang="en-US" smtClean="0"/>
-              <a:t>1/18/24</a:t>
+              <a:t>2/8/24</a:t>
             </a:fld>
             <a:endParaRPr lang="en-US"/>
           </a:p>
@@ -3104,7 +3104,7 @@
           <a:p>
             <a:fld id="{9FE185F7-9B28-9F45-9F43-9CB5A0B99390}" type="datetimeFigureOut">
               <a:rPr lang="en-US" smtClean="0"/>
-              <a:t>1/18/24</a:t>
+              <a:t>2/8/24</a:t>
             </a:fld>
             <a:endParaRPr lang="en-US"/>
           </a:p>
@@ -3345,7 +3345,7 @@
           <a:p>
             <a:fld id="{9FE185F7-9B28-9F45-9F43-9CB5A0B99390}" type="datetimeFigureOut">
               <a:rPr lang="en-US" smtClean="0"/>
-              <a:t>1/18/24</a:t>
+              <a:t>2/8/24</a:t>
             </a:fld>
             <a:endParaRPr lang="en-US"/>
           </a:p>
@@ -4026,10 +4026,85 @@
       </p:sp>
       <p:sp>
         <p:nvSpPr>
-          <p:cNvPr id="128" name="Rectangle 127">
-            <a:extLst>
-              <a:ext uri="{FF2B5EF4-FFF2-40B4-BE49-F238E27FC236}">
-                <a16:creationId xmlns:a16="http://schemas.microsoft.com/office/drawing/2014/main" id="{747041A4-100F-0D48-87F9-E63DDDFD96C6}"/>
+          <p:cNvPr id="151" name="TextBox 150">
+            <a:extLst>
+              <a:ext uri="{FF2B5EF4-FFF2-40B4-BE49-F238E27FC236}">
+                <a16:creationId xmlns:a16="http://schemas.microsoft.com/office/drawing/2014/main" id="{08B67E83-7D09-C748-AEEF-49786315014A}"/>
+              </a:ext>
+            </a:extLst>
+          </p:cNvPr>
+          <p:cNvSpPr txBox="1"/>
+          <p:nvPr/>
+        </p:nvSpPr>
+        <p:spPr>
+          <a:xfrm>
+            <a:off x="1130566" y="2049289"/>
+            <a:ext cx="1240931" cy="430887"/>
+          </a:xfrm>
+          <a:prstGeom prst="rect">
+            <a:avLst/>
+          </a:prstGeom>
+          <a:noFill/>
+        </p:spPr>
+        <p:txBody>
+          <a:bodyPr wrap="square" rtlCol="0">
+            <a:spAutoFit/>
+          </a:bodyPr>
+          <a:lstStyle/>
+          <a:p>
+            <a:pPr algn="ctr"/>
+            <a:r>
+              <a:rPr lang="en-US" sz="1100" dirty="0">
+                <a:latin typeface="Arial" panose="020B0604020202020204" pitchFamily="34" charset="0"/>
+                <a:cs typeface="Arial" panose="020B0604020202020204" pitchFamily="34" charset="0"/>
+              </a:rPr>
+              <a:t>AWS CloudFormation</a:t>
+            </a:r>
+          </a:p>
+        </p:txBody>
+      </p:sp>
+      <p:pic>
+        <p:nvPicPr>
+          <p:cNvPr id="152" name="Graphic 151">
+            <a:extLst>
+              <a:ext uri="{FF2B5EF4-FFF2-40B4-BE49-F238E27FC236}">
+                <a16:creationId xmlns:a16="http://schemas.microsoft.com/office/drawing/2014/main" id="{399FFB55-9DC7-0642-93ED-51225281247C}"/>
+              </a:ext>
+            </a:extLst>
+          </p:cNvPr>
+          <p:cNvPicPr>
+            <a:picLocks noChangeAspect="1"/>
+          </p:cNvPicPr>
+          <p:nvPr/>
+        </p:nvPicPr>
+        <p:blipFill>
+          <a:blip r:embed="rId5">
+            <a:extLst>
+              <a:ext uri="{96DAC541-7B7A-43D3-8B79-37D633B846F1}">
+                <asvg:svgBlip xmlns:asvg="http://schemas.microsoft.com/office/drawing/2016/SVG/main" r:embed="rId6"/>
+              </a:ext>
+            </a:extLst>
+          </a:blip>
+          <a:stretch>
+            <a:fillRect/>
+          </a:stretch>
+        </p:blipFill>
+        <p:spPr>
+          <a:xfrm>
+            <a:off x="1522432" y="1585349"/>
+            <a:ext cx="457200" cy="457200"/>
+          </a:xfrm>
+          <a:prstGeom prst="rect">
+            <a:avLst/>
+          </a:prstGeom>
+        </p:spPr>
+      </p:pic>
+      <p:sp>
+        <p:nvSpPr>
+          <p:cNvPr id="153" name="Rectangle 152">
+            <a:extLst>
+              <a:ext uri="{FF2B5EF4-FFF2-40B4-BE49-F238E27FC236}">
+                <a16:creationId xmlns:a16="http://schemas.microsoft.com/office/drawing/2014/main" id="{CB91CC3D-9B41-4F4E-A36E-8EBAE5690590}"/>
               </a:ext>
             </a:extLst>
           </p:cNvPr>
@@ -4038,8 +4113,8 @@
         </p:nvSpPr>
         <p:spPr>
           <a:xfrm>
-            <a:off x="7889985" y="373781"/>
-            <a:ext cx="3461940" cy="3115711"/>
+            <a:off x="1125977" y="1278233"/>
+            <a:ext cx="6494832" cy="3263355"/>
           </a:xfrm>
           <a:prstGeom prst="rect">
             <a:avLst/>
@@ -4049,7 +4124,7 @@
             <a:solidFill>
               <a:schemeClr val="tx1"/>
             </a:solidFill>
-            <a:prstDash val="solid"/>
+            <a:prstDash val="dash"/>
           </a:ln>
         </p:spPr>
         <p:style>
@@ -4069,7 +4144,7 @@
           </a:fontRef>
         </p:style>
         <p:txBody>
-          <a:bodyPr rot="0" spcFirstLastPara="0" vertOverflow="overflow" horzOverflow="overflow" vert="horz" wrap="square" lIns="91440" tIns="91440" rIns="91440" bIns="45720" numCol="1" spcCol="0" rtlCol="0" fromWordArt="0" anchor="t" anchorCtr="0" forceAA="0" compatLnSpc="1">
+          <a:bodyPr rot="0" spcFirstLastPara="0" vertOverflow="overflow" horzOverflow="overflow" vert="horz" wrap="square" lIns="91440" tIns="0" rIns="91440" bIns="45720" numCol="1" spcCol="0" rtlCol="0" fromWordArt="0" anchor="t" anchorCtr="0" forceAA="0" compatLnSpc="1">
             <a:prstTxWarp prst="textNoShape">
               <a:avLst/>
             </a:prstTxWarp>
@@ -4077,134 +4152,44 @@
           </a:bodyPr>
           <a:lstStyle/>
           <a:p>
-            <a:pPr algn="ctr"/>
-            <a:r>
-              <a:rPr lang="en-US" sz="1400" dirty="0">
+            <a:r>
+              <a:rPr lang="en-US" sz="1200" b="1" dirty="0">
                 <a:solidFill>
                   <a:schemeClr val="tx1"/>
                 </a:solidFill>
-                <a:latin typeface="Arial" panose="020B0604020202020204" pitchFamily="34" charset="0"/>
-                <a:cs typeface="Arial" panose="020B0604020202020204" pitchFamily="34" charset="0"/>
               </a:rPr>
-              <a:t>Audit Account</a:t>
-            </a:r>
-          </a:p>
-          <a:p>
-            <a:pPr algn="ctr"/>
-            <a:r>
-              <a:rPr lang="en-US" sz="1200" dirty="0">
-                <a:solidFill>
-                  <a:schemeClr val="tx1"/>
-                </a:solidFill>
-                <a:latin typeface="Arial" panose="020B0604020202020204" pitchFamily="34" charset="0"/>
-                <a:cs typeface="Arial" panose="020B0604020202020204" pitchFamily="34" charset="0"/>
-              </a:rPr>
-              <a:t>OU: Security</a:t>
-            </a:r>
-          </a:p>
-        </p:txBody>
-      </p:sp>
-      <p:sp>
-        <p:nvSpPr>
-          <p:cNvPr id="151" name="TextBox 150">
-            <a:extLst>
-              <a:ext uri="{FF2B5EF4-FFF2-40B4-BE49-F238E27FC236}">
-                <a16:creationId xmlns:a16="http://schemas.microsoft.com/office/drawing/2014/main" id="{08B67E83-7D09-C748-AEEF-49786315014A}"/>
-              </a:ext>
-            </a:extLst>
-          </p:cNvPr>
-          <p:cNvSpPr txBox="1"/>
+              <a:t>Home-region</a:t>
+            </a:r>
+          </a:p>
+        </p:txBody>
+      </p:sp>
+      <p:sp>
+        <p:nvSpPr>
+          <p:cNvPr id="226" name="Oval 225">
+            <a:extLst>
+              <a:ext uri="{FF2B5EF4-FFF2-40B4-BE49-F238E27FC236}">
+                <a16:creationId xmlns:a16="http://schemas.microsoft.com/office/drawing/2014/main" id="{B075B0CF-8F6A-3947-BD02-50EB6DA85CEE}"/>
+              </a:ext>
+            </a:extLst>
+          </p:cNvPr>
+          <p:cNvSpPr/>
           <p:nvPr/>
         </p:nvSpPr>
         <p:spPr>
           <a:xfrm>
-            <a:off x="1130566" y="2049289"/>
-            <a:ext cx="1240931" cy="430887"/>
-          </a:xfrm>
-          <a:prstGeom prst="rect">
+            <a:off x="996927" y="899058"/>
+            <a:ext cx="253435" cy="212902"/>
+          </a:xfrm>
+          <a:prstGeom prst="ellipse">
             <a:avLst/>
           </a:prstGeom>
-          <a:noFill/>
-        </p:spPr>
-        <p:txBody>
-          <a:bodyPr wrap="square" rtlCol="0">
-            <a:spAutoFit/>
-          </a:bodyPr>
-          <a:lstStyle/>
-          <a:p>
-            <a:pPr algn="ctr"/>
-            <a:r>
-              <a:rPr lang="en-US" sz="1100" dirty="0">
-                <a:latin typeface="Arial" panose="020B0604020202020204" pitchFamily="34" charset="0"/>
-                <a:cs typeface="Arial" panose="020B0604020202020204" pitchFamily="34" charset="0"/>
-              </a:rPr>
-              <a:t>AWS CloudFormation</a:t>
-            </a:r>
-          </a:p>
-        </p:txBody>
-      </p:sp>
-      <p:pic>
-        <p:nvPicPr>
-          <p:cNvPr id="152" name="Graphic 151">
-            <a:extLst>
-              <a:ext uri="{FF2B5EF4-FFF2-40B4-BE49-F238E27FC236}">
-                <a16:creationId xmlns:a16="http://schemas.microsoft.com/office/drawing/2014/main" id="{399FFB55-9DC7-0642-93ED-51225281247C}"/>
-              </a:ext>
-            </a:extLst>
-          </p:cNvPr>
-          <p:cNvPicPr>
-            <a:picLocks noChangeAspect="1"/>
-          </p:cNvPicPr>
-          <p:nvPr/>
-        </p:nvPicPr>
-        <p:blipFill>
-          <a:blip r:embed="rId5">
-            <a:extLst>
-              <a:ext uri="{96DAC541-7B7A-43D3-8B79-37D633B846F1}">
-                <asvg:svgBlip xmlns:asvg="http://schemas.microsoft.com/office/drawing/2016/SVG/main" r:embed="rId6"/>
-              </a:ext>
-            </a:extLst>
-          </a:blip>
-          <a:stretch>
-            <a:fillRect/>
-          </a:stretch>
-        </p:blipFill>
-        <p:spPr>
-          <a:xfrm>
-            <a:off x="1522432" y="1585349"/>
-            <a:ext cx="457200" cy="457200"/>
-          </a:xfrm>
-          <a:prstGeom prst="rect">
-            <a:avLst/>
-          </a:prstGeom>
-        </p:spPr>
-      </p:pic>
-      <p:sp>
-        <p:nvSpPr>
-          <p:cNvPr id="153" name="Rectangle 152">
-            <a:extLst>
-              <a:ext uri="{FF2B5EF4-FFF2-40B4-BE49-F238E27FC236}">
-                <a16:creationId xmlns:a16="http://schemas.microsoft.com/office/drawing/2014/main" id="{CB91CC3D-9B41-4F4E-A36E-8EBAE5690590}"/>
-              </a:ext>
-            </a:extLst>
-          </p:cNvPr>
-          <p:cNvSpPr/>
-          <p:nvPr/>
-        </p:nvSpPr>
-        <p:spPr>
-          <a:xfrm>
-            <a:off x="1125977" y="1278233"/>
-            <a:ext cx="6494832" cy="3263355"/>
-          </a:xfrm>
-          <a:prstGeom prst="rect">
-            <a:avLst/>
-          </a:prstGeom>
-          <a:noFill/>
-          <a:ln w="12700">
+          <a:solidFill>
+            <a:schemeClr val="tx1"/>
+          </a:solidFill>
+          <a:ln>
             <a:solidFill>
               <a:schemeClr val="tx1"/>
             </a:solidFill>
-            <a:prstDash val="dash"/>
           </a:ln>
         </p:spPr>
         <p:style>
@@ -4224,31 +4209,26 @@
           </a:fontRef>
         </p:style>
         <p:txBody>
-          <a:bodyPr rot="0" spcFirstLastPara="0" vertOverflow="overflow" horzOverflow="overflow" vert="horz" wrap="square" lIns="91440" tIns="0" rIns="91440" bIns="45720" numCol="1" spcCol="0" rtlCol="0" fromWordArt="0" anchor="t" anchorCtr="0" forceAA="0" compatLnSpc="1">
-            <a:prstTxWarp prst="textNoShape">
-              <a:avLst/>
-            </a:prstTxWarp>
-            <a:noAutofit/>
-          </a:bodyPr>
+          <a:bodyPr lIns="0" tIns="0" rIns="0" bIns="0" rtlCol="0" anchor="ctr"/>
           <a:lstStyle/>
           <a:p>
-            <a:r>
-              <a:rPr lang="en-US" sz="1200" b="1" dirty="0">
-                <a:solidFill>
-                  <a:schemeClr val="tx1"/>
-                </a:solidFill>
+            <a:pPr algn="ctr"/>
+            <a:r>
+              <a:rPr lang="en-US" sz="800" dirty="0">
+                <a:latin typeface="Arial" panose="020B0604020202020204" pitchFamily="34" charset="0"/>
+                <a:cs typeface="Arial" panose="020B0604020202020204" pitchFamily="34" charset="0"/>
               </a:rPr>
-              <a:t>Home-region</a:t>
-            </a:r>
-          </a:p>
-        </p:txBody>
-      </p:sp>
-      <p:sp>
-        <p:nvSpPr>
-          <p:cNvPr id="226" name="Oval 225">
-            <a:extLst>
-              <a:ext uri="{FF2B5EF4-FFF2-40B4-BE49-F238E27FC236}">
-                <a16:creationId xmlns:a16="http://schemas.microsoft.com/office/drawing/2014/main" id="{B075B0CF-8F6A-3947-BD02-50EB6DA85CEE}"/>
+              <a:t>1.0</a:t>
+            </a:r>
+          </a:p>
+        </p:txBody>
+      </p:sp>
+      <p:sp>
+        <p:nvSpPr>
+          <p:cNvPr id="227" name="Oval 226">
+            <a:extLst>
+              <a:ext uri="{FF2B5EF4-FFF2-40B4-BE49-F238E27FC236}">
+                <a16:creationId xmlns:a16="http://schemas.microsoft.com/office/drawing/2014/main" id="{F0D1735B-0005-B145-8C48-3E3934A1D64E}"/>
               </a:ext>
             </a:extLst>
           </p:cNvPr>
@@ -4257,7 +4237,7 @@
         </p:nvSpPr>
         <p:spPr>
           <a:xfrm>
-            <a:off x="996927" y="899058"/>
+            <a:off x="1532391" y="1593418"/>
             <a:ext cx="253435" cy="212902"/>
           </a:xfrm>
           <a:prstGeom prst="ellipse">
@@ -4298,17 +4278,459 @@
                 <a:latin typeface="Arial" panose="020B0604020202020204" pitchFamily="34" charset="0"/>
                 <a:cs typeface="Arial" panose="020B0604020202020204" pitchFamily="34" charset="0"/>
               </a:rPr>
-              <a:t>1.0</a:t>
-            </a:r>
-          </a:p>
-        </p:txBody>
-      </p:sp>
-      <p:sp>
-        <p:nvSpPr>
-          <p:cNvPr id="227" name="Oval 226">
-            <a:extLst>
-              <a:ext uri="{FF2B5EF4-FFF2-40B4-BE49-F238E27FC236}">
-                <a16:creationId xmlns:a16="http://schemas.microsoft.com/office/drawing/2014/main" id="{F0D1735B-0005-B145-8C48-3E3934A1D64E}"/>
+              <a:t>1.1</a:t>
+            </a:r>
+          </a:p>
+        </p:txBody>
+      </p:sp>
+      <p:sp>
+        <p:nvSpPr>
+          <p:cNvPr id="52" name="TextBox 29">
+            <a:extLst>
+              <a:ext uri="{FF2B5EF4-FFF2-40B4-BE49-F238E27FC236}">
+                <a16:creationId xmlns:a16="http://schemas.microsoft.com/office/drawing/2014/main" id="{95A77985-9994-9042-96C7-A75BE742DD29}"/>
+              </a:ext>
+            </a:extLst>
+          </p:cNvPr>
+          <p:cNvSpPr txBox="1">
+            <a:spLocks noChangeArrowheads="1"/>
+          </p:cNvSpPr>
+          <p:nvPr/>
+        </p:nvSpPr>
+        <p:spPr bwMode="auto">
+          <a:xfrm>
+            <a:off x="1160528" y="4210710"/>
+            <a:ext cx="1107245" cy="261610"/>
+          </a:xfrm>
+          <a:prstGeom prst="rect">
+            <a:avLst/>
+          </a:prstGeom>
+          <a:noFill/>
+          <a:ln>
+            <a:noFill/>
+          </a:ln>
+          <a:extLst>
+            <a:ext uri="{909E8E84-426E-40DD-AFC4-6F175D3DCCD1}">
+              <a14:hiddenFill xmlns:a14="http://schemas.microsoft.com/office/drawing/2010/main">
+                <a:solidFill>
+                  <a:srgbClr val="FFFFFF"/>
+                </a:solidFill>
+              </a14:hiddenFill>
+            </a:ext>
+            <a:ext uri="{91240B29-F687-4F45-9708-019B960494DF}">
+              <a14:hiddenLine xmlns:a14="http://schemas.microsoft.com/office/drawing/2010/main" w="9525">
+                <a:solidFill>
+                  <a:srgbClr val="000000"/>
+                </a:solidFill>
+                <a:miter lim="800000"/>
+                <a:headEnd/>
+                <a:tailEnd/>
+              </a14:hiddenLine>
+            </a:ext>
+          </a:extLst>
+        </p:spPr>
+        <p:txBody>
+          <a:bodyPr wrap="square">
+            <a:spAutoFit/>
+          </a:bodyPr>
+          <a:lstStyle>
+            <a:lvl1pPr>
+              <a:defRPr>
+                <a:solidFill>
+                  <a:schemeClr val="tx1"/>
+                </a:solidFill>
+                <a:latin typeface="Calibri" panose="020F0502020204030204" pitchFamily="34" charset="0"/>
+              </a:defRPr>
+            </a:lvl1pPr>
+            <a:lvl2pPr marL="742950" indent="-285750">
+              <a:defRPr>
+                <a:solidFill>
+                  <a:schemeClr val="tx1"/>
+                </a:solidFill>
+                <a:latin typeface="Calibri" panose="020F0502020204030204" pitchFamily="34" charset="0"/>
+              </a:defRPr>
+            </a:lvl2pPr>
+            <a:lvl3pPr marL="1143000" indent="-228600">
+              <a:defRPr>
+                <a:solidFill>
+                  <a:schemeClr val="tx1"/>
+                </a:solidFill>
+                <a:latin typeface="Calibri" panose="020F0502020204030204" pitchFamily="34" charset="0"/>
+              </a:defRPr>
+            </a:lvl3pPr>
+            <a:lvl4pPr marL="1600200" indent="-228600">
+              <a:defRPr>
+                <a:solidFill>
+                  <a:schemeClr val="tx1"/>
+                </a:solidFill>
+                <a:latin typeface="Calibri" panose="020F0502020204030204" pitchFamily="34" charset="0"/>
+              </a:defRPr>
+            </a:lvl4pPr>
+            <a:lvl5pPr marL="2057400" indent="-228600">
+              <a:defRPr>
+                <a:solidFill>
+                  <a:schemeClr val="tx1"/>
+                </a:solidFill>
+                <a:latin typeface="Calibri" panose="020F0502020204030204" pitchFamily="34" charset="0"/>
+              </a:defRPr>
+            </a:lvl5pPr>
+            <a:lvl6pPr marL="2514600" indent="-228600" eaLnBrk="0" fontAlgn="base" hangingPunct="0">
+              <a:spcBef>
+                <a:spcPct val="0"/>
+              </a:spcBef>
+              <a:spcAft>
+                <a:spcPct val="0"/>
+              </a:spcAft>
+              <a:defRPr>
+                <a:solidFill>
+                  <a:schemeClr val="tx1"/>
+                </a:solidFill>
+                <a:latin typeface="Calibri" panose="020F0502020204030204" pitchFamily="34" charset="0"/>
+              </a:defRPr>
+            </a:lvl6pPr>
+            <a:lvl7pPr marL="2971800" indent="-228600" eaLnBrk="0" fontAlgn="base" hangingPunct="0">
+              <a:spcBef>
+                <a:spcPct val="0"/>
+              </a:spcBef>
+              <a:spcAft>
+                <a:spcPct val="0"/>
+              </a:spcAft>
+              <a:defRPr>
+                <a:solidFill>
+                  <a:schemeClr val="tx1"/>
+                </a:solidFill>
+                <a:latin typeface="Calibri" panose="020F0502020204030204" pitchFamily="34" charset="0"/>
+              </a:defRPr>
+            </a:lvl7pPr>
+            <a:lvl8pPr marL="3429000" indent="-228600" eaLnBrk="0" fontAlgn="base" hangingPunct="0">
+              <a:spcBef>
+                <a:spcPct val="0"/>
+              </a:spcBef>
+              <a:spcAft>
+                <a:spcPct val="0"/>
+              </a:spcAft>
+              <a:defRPr>
+                <a:solidFill>
+                  <a:schemeClr val="tx1"/>
+                </a:solidFill>
+                <a:latin typeface="Calibri" panose="020F0502020204030204" pitchFamily="34" charset="0"/>
+              </a:defRPr>
+            </a:lvl8pPr>
+            <a:lvl9pPr marL="3886200" indent="-228600" eaLnBrk="0" fontAlgn="base" hangingPunct="0">
+              <a:spcBef>
+                <a:spcPct val="0"/>
+              </a:spcBef>
+              <a:spcAft>
+                <a:spcPct val="0"/>
+              </a:spcAft>
+              <a:defRPr>
+                <a:solidFill>
+                  <a:schemeClr val="tx1"/>
+                </a:solidFill>
+                <a:latin typeface="Calibri" panose="020F0502020204030204" pitchFamily="34" charset="0"/>
+              </a:defRPr>
+            </a:lvl9pPr>
+          </a:lstStyle>
+          <a:p>
+            <a:pPr algn="ctr" eaLnBrk="1" hangingPunct="1"/>
+            <a:r>
+              <a:rPr lang="en-US" altLang="en-US" sz="1100" dirty="0">
+                <a:latin typeface="Arial" panose="020B0604020202020204" pitchFamily="34" charset="0"/>
+                <a:ea typeface="Amazon Ember" panose="020B0603020204020204" pitchFamily="34" charset="0"/>
+                <a:cs typeface="Arial" panose="020B0604020202020204" pitchFamily="34" charset="0"/>
+              </a:rPr>
+              <a:t>IAM Roles</a:t>
+            </a:r>
+          </a:p>
+        </p:txBody>
+      </p:sp>
+      <p:pic>
+        <p:nvPicPr>
+          <p:cNvPr id="53" name="Graphic 49">
+            <a:extLst>
+              <a:ext uri="{FF2B5EF4-FFF2-40B4-BE49-F238E27FC236}">
+                <a16:creationId xmlns:a16="http://schemas.microsoft.com/office/drawing/2014/main" id="{E5A43064-1E8C-D64F-9E2D-DA95886F7A4B}"/>
+              </a:ext>
+            </a:extLst>
+          </p:cNvPr>
+          <p:cNvPicPr>
+            <a:picLocks noChangeAspect="1" noChangeArrowheads="1"/>
+          </p:cNvPicPr>
+          <p:nvPr/>
+        </p:nvPicPr>
+        <p:blipFill>
+          <a:blip r:embed="rId7">
+            <a:extLst>
+              <a:ext uri="{28A0092B-C50C-407E-A947-70E740481C1C}">
+                <a14:useLocalDpi xmlns:a14="http://schemas.microsoft.com/office/drawing/2010/main" val="0"/>
+              </a:ext>
+            </a:extLst>
+          </a:blip>
+          <a:srcRect/>
+          <a:stretch>
+            <a:fillRect/>
+          </a:stretch>
+        </p:blipFill>
+        <p:spPr bwMode="auto">
+          <a:xfrm>
+            <a:off x="1429987" y="3866043"/>
+            <a:ext cx="457200" cy="457200"/>
+          </a:xfrm>
+          <a:prstGeom prst="rect">
+            <a:avLst/>
+          </a:prstGeom>
+          <a:noFill/>
+          <a:ln>
+            <a:noFill/>
+          </a:ln>
+          <a:extLst>
+            <a:ext uri="{909E8E84-426E-40DD-AFC4-6F175D3DCCD1}">
+              <a14:hiddenFill xmlns:a14="http://schemas.microsoft.com/office/drawing/2010/main">
+                <a:solidFill>
+                  <a:srgbClr val="FFFFFF"/>
+                </a:solidFill>
+              </a14:hiddenFill>
+            </a:ext>
+            <a:ext uri="{91240B29-F687-4F45-9708-019B960494DF}">
+              <a14:hiddenLine xmlns:a14="http://schemas.microsoft.com/office/drawing/2010/main" w="9525">
+                <a:solidFill>
+                  <a:srgbClr val="000000"/>
+                </a:solidFill>
+                <a:miter lim="800000"/>
+                <a:headEnd/>
+                <a:tailEnd/>
+              </a14:hiddenLine>
+            </a:ext>
+          </a:extLst>
+        </p:spPr>
+      </p:pic>
+      <p:pic>
+        <p:nvPicPr>
+          <p:cNvPr id="54" name="Graphic 24">
+            <a:extLst>
+              <a:ext uri="{FF2B5EF4-FFF2-40B4-BE49-F238E27FC236}">
+                <a16:creationId xmlns:a16="http://schemas.microsoft.com/office/drawing/2014/main" id="{0565F9CB-9F9E-E443-BF68-41C87611C350}"/>
+              </a:ext>
+            </a:extLst>
+          </p:cNvPr>
+          <p:cNvPicPr>
+            <a:picLocks noChangeAspect="1" noChangeArrowheads="1"/>
+          </p:cNvPicPr>
+          <p:nvPr/>
+        </p:nvPicPr>
+        <p:blipFill>
+          <a:blip r:embed="rId8">
+            <a:extLst>
+              <a:ext uri="{28A0092B-C50C-407E-A947-70E740481C1C}">
+                <a14:useLocalDpi xmlns:a14="http://schemas.microsoft.com/office/drawing/2010/main" val="0"/>
+              </a:ext>
+            </a:extLst>
+          </a:blip>
+          <a:srcRect/>
+          <a:stretch>
+            <a:fillRect/>
+          </a:stretch>
+        </p:blipFill>
+        <p:spPr bwMode="auto">
+          <a:xfrm>
+            <a:off x="2968407" y="2679806"/>
+            <a:ext cx="457200" cy="457200"/>
+          </a:xfrm>
+          <a:prstGeom prst="rect">
+            <a:avLst/>
+          </a:prstGeom>
+          <a:noFill/>
+          <a:ln>
+            <a:noFill/>
+          </a:ln>
+          <a:extLst>
+            <a:ext uri="{909E8E84-426E-40DD-AFC4-6F175D3DCCD1}">
+              <a14:hiddenFill xmlns:a14="http://schemas.microsoft.com/office/drawing/2010/main">
+                <a:solidFill>
+                  <a:srgbClr val="FFFFFF"/>
+                </a:solidFill>
+              </a14:hiddenFill>
+            </a:ext>
+            <a:ext uri="{91240B29-F687-4F45-9708-019B960494DF}">
+              <a14:hiddenLine xmlns:a14="http://schemas.microsoft.com/office/drawing/2010/main" w="9525">
+                <a:solidFill>
+                  <a:srgbClr val="000000"/>
+                </a:solidFill>
+                <a:miter lim="800000"/>
+                <a:headEnd/>
+                <a:tailEnd/>
+              </a14:hiddenLine>
+            </a:ext>
+          </a:extLst>
+        </p:spPr>
+      </p:pic>
+      <p:sp>
+        <p:nvSpPr>
+          <p:cNvPr id="55" name="TextBox 26">
+            <a:extLst>
+              <a:ext uri="{FF2B5EF4-FFF2-40B4-BE49-F238E27FC236}">
+                <a16:creationId xmlns:a16="http://schemas.microsoft.com/office/drawing/2014/main" id="{8C01A33B-B67C-0445-AA21-F3786470D6FF}"/>
+              </a:ext>
+            </a:extLst>
+          </p:cNvPr>
+          <p:cNvSpPr txBox="1">
+            <a:spLocks noChangeArrowheads="1"/>
+          </p:cNvSpPr>
+          <p:nvPr/>
+        </p:nvSpPr>
+        <p:spPr bwMode="auto">
+          <a:xfrm>
+            <a:off x="2679593" y="3119506"/>
+            <a:ext cx="969198" cy="430887"/>
+          </a:xfrm>
+          <a:prstGeom prst="rect">
+            <a:avLst/>
+          </a:prstGeom>
+          <a:noFill/>
+          <a:ln>
+            <a:noFill/>
+          </a:ln>
+          <a:extLst>
+            <a:ext uri="{909E8E84-426E-40DD-AFC4-6F175D3DCCD1}">
+              <a14:hiddenFill xmlns:a14="http://schemas.microsoft.com/office/drawing/2010/main">
+                <a:solidFill>
+                  <a:srgbClr val="FFFFFF"/>
+                </a:solidFill>
+              </a14:hiddenFill>
+            </a:ext>
+            <a:ext uri="{91240B29-F687-4F45-9708-019B960494DF}">
+              <a14:hiddenLine xmlns:a14="http://schemas.microsoft.com/office/drawing/2010/main" w="9525">
+                <a:solidFill>
+                  <a:srgbClr val="000000"/>
+                </a:solidFill>
+                <a:miter lim="800000"/>
+                <a:headEnd/>
+                <a:tailEnd/>
+              </a14:hiddenLine>
+            </a:ext>
+          </a:extLst>
+        </p:spPr>
+        <p:txBody>
+          <a:bodyPr wrap="square">
+            <a:spAutoFit/>
+          </a:bodyPr>
+          <a:lstStyle>
+            <a:lvl1pPr>
+              <a:defRPr>
+                <a:solidFill>
+                  <a:schemeClr val="tx1"/>
+                </a:solidFill>
+                <a:latin typeface="Calibri" panose="020F0502020204030204" pitchFamily="34" charset="0"/>
+              </a:defRPr>
+            </a:lvl1pPr>
+            <a:lvl2pPr marL="742950" indent="-285750">
+              <a:defRPr>
+                <a:solidFill>
+                  <a:schemeClr val="tx1"/>
+                </a:solidFill>
+                <a:latin typeface="Calibri" panose="020F0502020204030204" pitchFamily="34" charset="0"/>
+              </a:defRPr>
+            </a:lvl2pPr>
+            <a:lvl3pPr marL="1143000" indent="-228600">
+              <a:defRPr>
+                <a:solidFill>
+                  <a:schemeClr val="tx1"/>
+                </a:solidFill>
+                <a:latin typeface="Calibri" panose="020F0502020204030204" pitchFamily="34" charset="0"/>
+              </a:defRPr>
+            </a:lvl3pPr>
+            <a:lvl4pPr marL="1600200" indent="-228600">
+              <a:defRPr>
+                <a:solidFill>
+                  <a:schemeClr val="tx1"/>
+                </a:solidFill>
+                <a:latin typeface="Calibri" panose="020F0502020204030204" pitchFamily="34" charset="0"/>
+              </a:defRPr>
+            </a:lvl4pPr>
+            <a:lvl5pPr marL="2057400" indent="-228600">
+              <a:defRPr>
+                <a:solidFill>
+                  <a:schemeClr val="tx1"/>
+                </a:solidFill>
+                <a:latin typeface="Calibri" panose="020F0502020204030204" pitchFamily="34" charset="0"/>
+              </a:defRPr>
+            </a:lvl5pPr>
+            <a:lvl6pPr marL="2514600" indent="-228600" eaLnBrk="0" fontAlgn="base" hangingPunct="0">
+              <a:spcBef>
+                <a:spcPct val="0"/>
+              </a:spcBef>
+              <a:spcAft>
+                <a:spcPct val="0"/>
+              </a:spcAft>
+              <a:defRPr>
+                <a:solidFill>
+                  <a:schemeClr val="tx1"/>
+                </a:solidFill>
+                <a:latin typeface="Calibri" panose="020F0502020204030204" pitchFamily="34" charset="0"/>
+              </a:defRPr>
+            </a:lvl6pPr>
+            <a:lvl7pPr marL="2971800" indent="-228600" eaLnBrk="0" fontAlgn="base" hangingPunct="0">
+              <a:spcBef>
+                <a:spcPct val="0"/>
+              </a:spcBef>
+              <a:spcAft>
+                <a:spcPct val="0"/>
+              </a:spcAft>
+              <a:defRPr>
+                <a:solidFill>
+                  <a:schemeClr val="tx1"/>
+                </a:solidFill>
+                <a:latin typeface="Calibri" panose="020F0502020204030204" pitchFamily="34" charset="0"/>
+              </a:defRPr>
+            </a:lvl7pPr>
+            <a:lvl8pPr marL="3429000" indent="-228600" eaLnBrk="0" fontAlgn="base" hangingPunct="0">
+              <a:spcBef>
+                <a:spcPct val="0"/>
+              </a:spcBef>
+              <a:spcAft>
+                <a:spcPct val="0"/>
+              </a:spcAft>
+              <a:defRPr>
+                <a:solidFill>
+                  <a:schemeClr val="tx1"/>
+                </a:solidFill>
+                <a:latin typeface="Calibri" panose="020F0502020204030204" pitchFamily="34" charset="0"/>
+              </a:defRPr>
+            </a:lvl8pPr>
+            <a:lvl9pPr marL="3886200" indent="-228600" eaLnBrk="0" fontAlgn="base" hangingPunct="0">
+              <a:spcBef>
+                <a:spcPct val="0"/>
+              </a:spcBef>
+              <a:spcAft>
+                <a:spcPct val="0"/>
+              </a:spcAft>
+              <a:defRPr>
+                <a:solidFill>
+                  <a:schemeClr val="tx1"/>
+                </a:solidFill>
+                <a:latin typeface="Calibri" panose="020F0502020204030204" pitchFamily="34" charset="0"/>
+              </a:defRPr>
+            </a:lvl9pPr>
+          </a:lstStyle>
+          <a:p>
+            <a:pPr algn="ctr" eaLnBrk="1" hangingPunct="1"/>
+            <a:r>
+              <a:rPr lang="en-US" altLang="en-US" sz="1100" dirty="0">
+                <a:latin typeface="Arial" panose="020B0604020202020204" pitchFamily="34" charset="0"/>
+                <a:ea typeface="Amazon Ember" panose="020B0603020204020204" pitchFamily="34" charset="0"/>
+                <a:cs typeface="Arial" panose="020B0604020202020204" pitchFamily="34" charset="0"/>
+              </a:rPr>
+              <a:t>Regional Event Rules</a:t>
+            </a:r>
+          </a:p>
+        </p:txBody>
+      </p:sp>
+      <p:sp>
+        <p:nvSpPr>
+          <p:cNvPr id="132" name="Oval 131">
+            <a:extLst>
+              <a:ext uri="{FF2B5EF4-FFF2-40B4-BE49-F238E27FC236}">
+                <a16:creationId xmlns:a16="http://schemas.microsoft.com/office/drawing/2014/main" id="{E90E9980-B378-8B48-A029-3577A1108948}"/>
               </a:ext>
             </a:extLst>
           </p:cNvPr>
@@ -4317,7 +4739,7 @@
         </p:nvSpPr>
         <p:spPr>
           <a:xfrm>
-            <a:off x="1532391" y="1593418"/>
+            <a:off x="1272421" y="3853363"/>
             <a:ext cx="253435" cy="212902"/>
           </a:xfrm>
           <a:prstGeom prst="ellipse">
@@ -4358,17 +4780,17 @@
                 <a:latin typeface="Arial" panose="020B0604020202020204" pitchFamily="34" charset="0"/>
                 <a:cs typeface="Arial" panose="020B0604020202020204" pitchFamily="34" charset="0"/>
               </a:rPr>
-              <a:t>1.1</a:t>
-            </a:r>
-          </a:p>
-        </p:txBody>
-      </p:sp>
-      <p:sp>
-        <p:nvSpPr>
-          <p:cNvPr id="233" name="Oval 232">
-            <a:extLst>
-              <a:ext uri="{FF2B5EF4-FFF2-40B4-BE49-F238E27FC236}">
-                <a16:creationId xmlns:a16="http://schemas.microsoft.com/office/drawing/2014/main" id="{4E5E3A8F-6978-7E4A-B538-0774C0EF83DA}"/>
+              <a:t>1.2</a:t>
+            </a:r>
+          </a:p>
+        </p:txBody>
+      </p:sp>
+      <p:sp>
+        <p:nvSpPr>
+          <p:cNvPr id="90" name="Rectangle 89">
+            <a:extLst>
+              <a:ext uri="{FF2B5EF4-FFF2-40B4-BE49-F238E27FC236}">
+                <a16:creationId xmlns:a16="http://schemas.microsoft.com/office/drawing/2014/main" id="{47B93F37-6BED-7842-BCB8-8257FA6836B8}"/>
               </a:ext>
             </a:extLst>
           </p:cNvPr>
@@ -4377,19 +4799,18 @@
         </p:nvSpPr>
         <p:spPr>
           <a:xfrm>
-            <a:off x="7916438" y="395622"/>
-            <a:ext cx="253435" cy="212902"/>
-          </a:xfrm>
-          <a:prstGeom prst="ellipse">
+            <a:off x="7947615" y="2128890"/>
+            <a:ext cx="3455224" cy="2750796"/>
+          </a:xfrm>
+          <a:prstGeom prst="rect">
             <a:avLst/>
           </a:prstGeom>
-          <a:solidFill>
-            <a:schemeClr val="tx1"/>
-          </a:solidFill>
-          <a:ln>
+          <a:noFill/>
+          <a:ln w="12700">
             <a:solidFill>
               <a:schemeClr val="tx1"/>
             </a:solidFill>
+            <a:prstDash val="solid"/>
           </a:ln>
         </p:spPr>
         <p:style>
@@ -4409,23 +4830,47 @@
           </a:fontRef>
         </p:style>
         <p:txBody>
-          <a:bodyPr lIns="0" tIns="0" rIns="0" bIns="0" rtlCol="0" anchor="ctr"/>
+          <a:bodyPr rot="0" spcFirstLastPara="0" vertOverflow="overflow" horzOverflow="overflow" vert="horz" wrap="square" lIns="91440" tIns="91440" rIns="91440" bIns="45720" numCol="1" spcCol="0" rtlCol="0" fromWordArt="0" anchor="t" anchorCtr="0" forceAA="0" compatLnSpc="1">
+            <a:prstTxWarp prst="textNoShape">
+              <a:avLst/>
+            </a:prstTxWarp>
+            <a:noAutofit/>
+          </a:bodyPr>
           <a:lstStyle/>
           <a:p>
             <a:pPr algn="ctr"/>
             <a:r>
-              <a:rPr lang="en-US" sz="800" dirty="0"/>
-              <a:t>2.0</a:t>
-            </a:r>
-          </a:p>
-        </p:txBody>
-      </p:sp>
-      <p:sp>
-        <p:nvSpPr>
-          <p:cNvPr id="107" name="Rectangle 106">
-            <a:extLst>
-              <a:ext uri="{FF2B5EF4-FFF2-40B4-BE49-F238E27FC236}">
-                <a16:creationId xmlns:a16="http://schemas.microsoft.com/office/drawing/2014/main" id="{F987F7DF-6CB9-144D-9E1D-1E6008DD66FB}"/>
+              <a:rPr lang="en-US" sz="1400" dirty="0">
+                <a:solidFill>
+                  <a:schemeClr val="tx1"/>
+                </a:solidFill>
+                <a:latin typeface="Arial" panose="020B0604020202020204" pitchFamily="34" charset="0"/>
+                <a:cs typeface="Arial" panose="020B0604020202020204" pitchFamily="34" charset="0"/>
+              </a:rPr>
+              <a:t>Existing and Future </a:t>
+            </a:r>
+          </a:p>
+          <a:p>
+            <a:pPr algn="ctr"/>
+            <a:r>
+              <a:rPr lang="en-US" sz="1400" dirty="0">
+                <a:solidFill>
+                  <a:schemeClr val="tx1"/>
+                </a:solidFill>
+                <a:latin typeface="Arial" panose="020B0604020202020204" pitchFamily="34" charset="0"/>
+                <a:cs typeface="Arial" panose="020B0604020202020204" pitchFamily="34" charset="0"/>
+              </a:rPr>
+              <a:t>Organization Accounts </a:t>
+            </a:r>
+          </a:p>
+        </p:txBody>
+      </p:sp>
+      <p:sp>
+        <p:nvSpPr>
+          <p:cNvPr id="91" name="Oval 90">
+            <a:extLst>
+              <a:ext uri="{FF2B5EF4-FFF2-40B4-BE49-F238E27FC236}">
+                <a16:creationId xmlns:a16="http://schemas.microsoft.com/office/drawing/2014/main" id="{4F6D3A5E-6D06-304A-97F5-69FDBDFDA450}"/>
               </a:ext>
             </a:extLst>
           </p:cNvPr>
@@ -4434,18 +4879,19 @@
         </p:nvSpPr>
         <p:spPr>
           <a:xfrm>
-            <a:off x="7995758" y="882694"/>
-            <a:ext cx="3260751" cy="2464949"/>
-          </a:xfrm>
-          <a:prstGeom prst="rect">
+            <a:off x="7974068" y="2150730"/>
+            <a:ext cx="253435" cy="212902"/>
+          </a:xfrm>
+          <a:prstGeom prst="ellipse">
             <a:avLst/>
           </a:prstGeom>
-          <a:noFill/>
-          <a:ln w="12700">
+          <a:solidFill>
+            <a:schemeClr val="tx1"/>
+          </a:solidFill>
+          <a:ln>
             <a:solidFill>
               <a:schemeClr val="tx1"/>
             </a:solidFill>
-            <a:prstDash val="dash"/>
           </a:ln>
         </p:spPr>
         <p:style>
@@ -4465,127 +4911,43 @@
           </a:fontRef>
         </p:style>
         <p:txBody>
-          <a:bodyPr rot="0" spcFirstLastPara="0" vertOverflow="overflow" horzOverflow="overflow" vert="horz" wrap="square" lIns="91440" tIns="0" rIns="91440" bIns="45720" numCol="1" spcCol="0" rtlCol="0" fromWordArt="0" anchor="t" anchorCtr="0" forceAA="0" compatLnSpc="1">
-            <a:prstTxWarp prst="textNoShape">
-              <a:avLst/>
-            </a:prstTxWarp>
-            <a:noAutofit/>
-          </a:bodyPr>
+          <a:bodyPr lIns="0" tIns="0" rIns="0" bIns="0" rtlCol="0" anchor="ctr"/>
           <a:lstStyle/>
           <a:p>
-            <a:r>
-              <a:rPr lang="en-US" sz="1200" b="1" dirty="0">
-                <a:solidFill>
-                  <a:schemeClr val="tx1"/>
-                </a:solidFill>
-              </a:rPr>
-              <a:t>Home-region</a:t>
-            </a:r>
-          </a:p>
-        </p:txBody>
-      </p:sp>
-      <p:sp>
-        <p:nvSpPr>
-          <p:cNvPr id="108" name="TextBox 107">
-            <a:extLst>
-              <a:ext uri="{FF2B5EF4-FFF2-40B4-BE49-F238E27FC236}">
-                <a16:creationId xmlns:a16="http://schemas.microsoft.com/office/drawing/2014/main" id="{B5BD843E-4A99-344F-B2BC-AB0E5E2CB733}"/>
-              </a:ext>
-            </a:extLst>
-          </p:cNvPr>
-          <p:cNvSpPr txBox="1"/>
+            <a:pPr algn="ctr"/>
+            <a:r>
+              <a:rPr lang="en-US" sz="800" dirty="0"/>
+              <a:t>2.0</a:t>
+            </a:r>
+          </a:p>
+        </p:txBody>
+      </p:sp>
+      <p:sp>
+        <p:nvSpPr>
+          <p:cNvPr id="92" name="Rectangle 91">
+            <a:extLst>
+              <a:ext uri="{FF2B5EF4-FFF2-40B4-BE49-F238E27FC236}">
+                <a16:creationId xmlns:a16="http://schemas.microsoft.com/office/drawing/2014/main" id="{00FDA628-A4EA-EB48-92B2-27CAC6AB8DD3}"/>
+              </a:ext>
+            </a:extLst>
+          </p:cNvPr>
+          <p:cNvSpPr/>
           <p:nvPr/>
         </p:nvSpPr>
         <p:spPr>
           <a:xfrm>
-            <a:off x="8353115" y="1603305"/>
-            <a:ext cx="1209667" cy="430887"/>
+            <a:off x="8046011" y="2736863"/>
+            <a:ext cx="3260622" cy="1997165"/>
           </a:xfrm>
           <a:prstGeom prst="rect">
             <a:avLst/>
           </a:prstGeom>
           <a:noFill/>
-        </p:spPr>
-        <p:txBody>
-          <a:bodyPr wrap="square" rtlCol="0">
-            <a:spAutoFit/>
-          </a:bodyPr>
-          <a:lstStyle/>
-          <a:p>
-            <a:pPr algn="ctr"/>
-            <a:r>
-              <a:rPr lang="en-US" sz="1100" dirty="0">
-                <a:latin typeface="Arial" panose="020B0604020202020204" pitchFamily="34" charset="0"/>
-                <a:cs typeface="Arial" panose="020B0604020202020204" pitchFamily="34" charset="0"/>
-              </a:rPr>
-              <a:t>AWS CloudFormation</a:t>
-            </a:r>
-          </a:p>
-        </p:txBody>
-      </p:sp>
-      <p:pic>
-        <p:nvPicPr>
-          <p:cNvPr id="109" name="Graphic 108">
-            <a:extLst>
-              <a:ext uri="{FF2B5EF4-FFF2-40B4-BE49-F238E27FC236}">
-                <a16:creationId xmlns:a16="http://schemas.microsoft.com/office/drawing/2014/main" id="{A640C55B-F6FD-3640-965F-605AEAB778BE}"/>
-              </a:ext>
-            </a:extLst>
-          </p:cNvPr>
-          <p:cNvPicPr>
-            <a:picLocks noChangeAspect="1"/>
-          </p:cNvPicPr>
-          <p:nvPr/>
-        </p:nvPicPr>
-        <p:blipFill>
-          <a:blip r:embed="rId5">
-            <a:extLst>
-              <a:ext uri="{96DAC541-7B7A-43D3-8B79-37D633B846F1}">
-                <asvg:svgBlip xmlns:asvg="http://schemas.microsoft.com/office/drawing/2016/SVG/main" r:embed="rId6"/>
-              </a:ext>
-            </a:extLst>
-          </a:blip>
-          <a:stretch>
-            <a:fillRect/>
-          </a:stretch>
-        </p:blipFill>
-        <p:spPr>
-          <a:xfrm>
-            <a:off x="8732456" y="1149702"/>
-            <a:ext cx="457200" cy="457200"/>
-          </a:xfrm>
-          <a:prstGeom prst="rect">
-            <a:avLst/>
-          </a:prstGeom>
-        </p:spPr>
-      </p:pic>
-      <p:sp>
-        <p:nvSpPr>
-          <p:cNvPr id="111" name="Oval 110">
-            <a:extLst>
-              <a:ext uri="{FF2B5EF4-FFF2-40B4-BE49-F238E27FC236}">
-                <a16:creationId xmlns:a16="http://schemas.microsoft.com/office/drawing/2014/main" id="{FB20F0D1-0CBE-9546-BAA5-F1447A9E8B2F}"/>
-              </a:ext>
-            </a:extLst>
-          </p:cNvPr>
-          <p:cNvSpPr/>
-          <p:nvPr/>
-        </p:nvSpPr>
-        <p:spPr>
-          <a:xfrm>
-            <a:off x="8742574" y="1158209"/>
-            <a:ext cx="253435" cy="212902"/>
-          </a:xfrm>
-          <a:prstGeom prst="ellipse">
-            <a:avLst/>
-          </a:prstGeom>
-          <a:solidFill>
-            <a:schemeClr val="tx1"/>
-          </a:solidFill>
-          <a:ln>
+          <a:ln w="12700">
             <a:solidFill>
               <a:schemeClr val="tx1"/>
             </a:solidFill>
+            <a:prstDash val="dash"/>
           </a:ln>
         </p:spPr>
         <p:style>
@@ -4605,700 +4967,106 @@
           </a:fontRef>
         </p:style>
         <p:txBody>
-          <a:bodyPr lIns="0" tIns="0" rIns="0" bIns="0" rtlCol="0" anchor="ctr"/>
+          <a:bodyPr rot="0" spcFirstLastPara="0" vertOverflow="overflow" horzOverflow="overflow" vert="horz" wrap="square" lIns="91440" tIns="0" rIns="91440" bIns="45720" numCol="1" spcCol="0" rtlCol="0" fromWordArt="0" anchor="t" anchorCtr="0" forceAA="0" compatLnSpc="1">
+            <a:prstTxWarp prst="textNoShape">
+              <a:avLst/>
+            </a:prstTxWarp>
+            <a:noAutofit/>
+          </a:bodyPr>
           <a:lstStyle/>
           <a:p>
-            <a:pPr algn="ctr"/>
-            <a:r>
-              <a:rPr lang="en-US" sz="800" dirty="0">
-                <a:latin typeface="Arial" panose="020B0604020202020204" pitchFamily="34" charset="0"/>
-                <a:cs typeface="Arial" panose="020B0604020202020204" pitchFamily="34" charset="0"/>
+            <a:r>
+              <a:rPr lang="en-US" sz="1200" b="1" dirty="0">
+                <a:solidFill>
+                  <a:schemeClr val="tx1"/>
+                </a:solidFill>
               </a:rPr>
-              <a:t>2.1</a:t>
-            </a:r>
-          </a:p>
-        </p:txBody>
-      </p:sp>
-      <p:sp>
-        <p:nvSpPr>
-          <p:cNvPr id="52" name="TextBox 29">
-            <a:extLst>
-              <a:ext uri="{FF2B5EF4-FFF2-40B4-BE49-F238E27FC236}">
-                <a16:creationId xmlns:a16="http://schemas.microsoft.com/office/drawing/2014/main" id="{95A77985-9994-9042-96C7-A75BE742DD29}"/>
-              </a:ext>
-            </a:extLst>
-          </p:cNvPr>
-          <p:cNvSpPr txBox="1">
-            <a:spLocks noChangeArrowheads="1"/>
-          </p:cNvSpPr>
+              <a:t>Home-region</a:t>
+            </a:r>
+          </a:p>
+        </p:txBody>
+      </p:sp>
+      <p:sp>
+        <p:nvSpPr>
+          <p:cNvPr id="93" name="TextBox 92">
+            <a:extLst>
+              <a:ext uri="{FF2B5EF4-FFF2-40B4-BE49-F238E27FC236}">
+                <a16:creationId xmlns:a16="http://schemas.microsoft.com/office/drawing/2014/main" id="{CDCCCE1E-DD4E-3D4B-BE03-47129D861225}"/>
+              </a:ext>
+            </a:extLst>
+          </p:cNvPr>
+          <p:cNvSpPr txBox="1"/>
           <p:nvPr/>
         </p:nvSpPr>
-        <p:spPr bwMode="auto">
+        <p:spPr>
           <a:xfrm>
-            <a:off x="1160528" y="4210710"/>
-            <a:ext cx="1107245" cy="261610"/>
+            <a:off x="8227404" y="3474705"/>
+            <a:ext cx="1209667" cy="430887"/>
           </a:xfrm>
           <a:prstGeom prst="rect">
             <a:avLst/>
           </a:prstGeom>
           <a:noFill/>
-          <a:ln>
-            <a:noFill/>
-          </a:ln>
-          <a:extLst>
-            <a:ext uri="{909E8E84-426E-40DD-AFC4-6F175D3DCCD1}">
-              <a14:hiddenFill xmlns:a14="http://schemas.microsoft.com/office/drawing/2010/main">
-                <a:solidFill>
-                  <a:srgbClr val="FFFFFF"/>
-                </a:solidFill>
-              </a14:hiddenFill>
-            </a:ext>
-            <a:ext uri="{91240B29-F687-4F45-9708-019B960494DF}">
-              <a14:hiddenLine xmlns:a14="http://schemas.microsoft.com/office/drawing/2010/main" w="9525">
-                <a:solidFill>
-                  <a:srgbClr val="000000"/>
-                </a:solidFill>
-                <a:miter lim="800000"/>
-                <a:headEnd/>
-                <a:tailEnd/>
-              </a14:hiddenLine>
-            </a:ext>
-          </a:extLst>
-        </p:spPr>
-        <p:txBody>
-          <a:bodyPr wrap="square">
+        </p:spPr>
+        <p:txBody>
+          <a:bodyPr wrap="square" rtlCol="0">
             <a:spAutoFit/>
           </a:bodyPr>
-          <a:lstStyle>
-            <a:lvl1pPr>
-              <a:defRPr>
-                <a:solidFill>
-                  <a:schemeClr val="tx1"/>
-                </a:solidFill>
-                <a:latin typeface="Calibri" panose="020F0502020204030204" pitchFamily="34" charset="0"/>
-              </a:defRPr>
-            </a:lvl1pPr>
-            <a:lvl2pPr marL="742950" indent="-285750">
-              <a:defRPr>
-                <a:solidFill>
-                  <a:schemeClr val="tx1"/>
-                </a:solidFill>
-                <a:latin typeface="Calibri" panose="020F0502020204030204" pitchFamily="34" charset="0"/>
-              </a:defRPr>
-            </a:lvl2pPr>
-            <a:lvl3pPr marL="1143000" indent="-228600">
-              <a:defRPr>
-                <a:solidFill>
-                  <a:schemeClr val="tx1"/>
-                </a:solidFill>
-                <a:latin typeface="Calibri" panose="020F0502020204030204" pitchFamily="34" charset="0"/>
-              </a:defRPr>
-            </a:lvl3pPr>
-            <a:lvl4pPr marL="1600200" indent="-228600">
-              <a:defRPr>
-                <a:solidFill>
-                  <a:schemeClr val="tx1"/>
-                </a:solidFill>
-                <a:latin typeface="Calibri" panose="020F0502020204030204" pitchFamily="34" charset="0"/>
-              </a:defRPr>
-            </a:lvl4pPr>
-            <a:lvl5pPr marL="2057400" indent="-228600">
-              <a:defRPr>
-                <a:solidFill>
-                  <a:schemeClr val="tx1"/>
-                </a:solidFill>
-                <a:latin typeface="Calibri" panose="020F0502020204030204" pitchFamily="34" charset="0"/>
-              </a:defRPr>
-            </a:lvl5pPr>
-            <a:lvl6pPr marL="2514600" indent="-228600" eaLnBrk="0" fontAlgn="base" hangingPunct="0">
-              <a:spcBef>
-                <a:spcPct val="0"/>
-              </a:spcBef>
-              <a:spcAft>
-                <a:spcPct val="0"/>
-              </a:spcAft>
-              <a:defRPr>
-                <a:solidFill>
-                  <a:schemeClr val="tx1"/>
-                </a:solidFill>
-                <a:latin typeface="Calibri" panose="020F0502020204030204" pitchFamily="34" charset="0"/>
-              </a:defRPr>
-            </a:lvl6pPr>
-            <a:lvl7pPr marL="2971800" indent="-228600" eaLnBrk="0" fontAlgn="base" hangingPunct="0">
-              <a:spcBef>
-                <a:spcPct val="0"/>
-              </a:spcBef>
-              <a:spcAft>
-                <a:spcPct val="0"/>
-              </a:spcAft>
-              <a:defRPr>
-                <a:solidFill>
-                  <a:schemeClr val="tx1"/>
-                </a:solidFill>
-                <a:latin typeface="Calibri" panose="020F0502020204030204" pitchFamily="34" charset="0"/>
-              </a:defRPr>
-            </a:lvl7pPr>
-            <a:lvl8pPr marL="3429000" indent="-228600" eaLnBrk="0" fontAlgn="base" hangingPunct="0">
-              <a:spcBef>
-                <a:spcPct val="0"/>
-              </a:spcBef>
-              <a:spcAft>
-                <a:spcPct val="0"/>
-              </a:spcAft>
-              <a:defRPr>
-                <a:solidFill>
-                  <a:schemeClr val="tx1"/>
-                </a:solidFill>
-                <a:latin typeface="Calibri" panose="020F0502020204030204" pitchFamily="34" charset="0"/>
-              </a:defRPr>
-            </a:lvl8pPr>
-            <a:lvl9pPr marL="3886200" indent="-228600" eaLnBrk="0" fontAlgn="base" hangingPunct="0">
-              <a:spcBef>
-                <a:spcPct val="0"/>
-              </a:spcBef>
-              <a:spcAft>
-                <a:spcPct val="0"/>
-              </a:spcAft>
-              <a:defRPr>
-                <a:solidFill>
-                  <a:schemeClr val="tx1"/>
-                </a:solidFill>
-                <a:latin typeface="Calibri" panose="020F0502020204030204" pitchFamily="34" charset="0"/>
-              </a:defRPr>
-            </a:lvl9pPr>
-          </a:lstStyle>
-          <a:p>
-            <a:pPr algn="ctr" eaLnBrk="1" hangingPunct="1"/>
-            <a:r>
-              <a:rPr lang="en-US" altLang="en-US" sz="1100" dirty="0">
+          <a:lstStyle/>
+          <a:p>
+            <a:pPr algn="ctr"/>
+            <a:r>
+              <a:rPr lang="en-US" sz="1100" dirty="0">
                 <a:latin typeface="Arial" panose="020B0604020202020204" pitchFamily="34" charset="0"/>
-                <a:ea typeface="Amazon Ember" panose="020B0603020204020204" pitchFamily="34" charset="0"/>
                 <a:cs typeface="Arial" panose="020B0604020202020204" pitchFamily="34" charset="0"/>
               </a:rPr>
-              <a:t>IAM Roles</a:t>
+              <a:t>AWS CloudFormation</a:t>
             </a:r>
           </a:p>
         </p:txBody>
       </p:sp>
       <p:pic>
         <p:nvPicPr>
-          <p:cNvPr id="53" name="Graphic 49">
-            <a:extLst>
-              <a:ext uri="{FF2B5EF4-FFF2-40B4-BE49-F238E27FC236}">
-                <a16:creationId xmlns:a16="http://schemas.microsoft.com/office/drawing/2014/main" id="{E5A43064-1E8C-D64F-9E2D-DA95886F7A4B}"/>
+          <p:cNvPr id="94" name="Graphic 93">
+            <a:extLst>
+              <a:ext uri="{FF2B5EF4-FFF2-40B4-BE49-F238E27FC236}">
+                <a16:creationId xmlns:a16="http://schemas.microsoft.com/office/drawing/2014/main" id="{31D7640F-4E48-1D4E-B8F0-CC6DBC330519}"/>
               </a:ext>
             </a:extLst>
           </p:cNvPr>
           <p:cNvPicPr>
-            <a:picLocks noChangeAspect="1" noChangeArrowheads="1"/>
+            <a:picLocks noChangeAspect="1"/>
           </p:cNvPicPr>
           <p:nvPr/>
         </p:nvPicPr>
         <p:blipFill>
-          <a:blip r:embed="rId7">
-            <a:extLst>
-              <a:ext uri="{28A0092B-C50C-407E-A947-70E740481C1C}">
-                <a14:useLocalDpi xmlns:a14="http://schemas.microsoft.com/office/drawing/2010/main" val="0"/>
+          <a:blip r:embed="rId5">
+            <a:extLst>
+              <a:ext uri="{96DAC541-7B7A-43D3-8B79-37D633B846F1}">
+                <asvg:svgBlip xmlns:asvg="http://schemas.microsoft.com/office/drawing/2016/SVG/main" r:embed="rId6"/>
               </a:ext>
             </a:extLst>
           </a:blip>
-          <a:srcRect/>
           <a:stretch>
             <a:fillRect/>
           </a:stretch>
         </p:blipFill>
-        <p:spPr bwMode="auto">
+        <p:spPr>
           <a:xfrm>
-            <a:off x="1429987" y="3866043"/>
+            <a:off x="8606745" y="3021102"/>
             <a:ext cx="457200" cy="457200"/>
           </a:xfrm>
           <a:prstGeom prst="rect">
             <a:avLst/>
           </a:prstGeom>
-          <a:noFill/>
-          <a:ln>
-            <a:noFill/>
-          </a:ln>
-          <a:extLst>
-            <a:ext uri="{909E8E84-426E-40DD-AFC4-6F175D3DCCD1}">
-              <a14:hiddenFill xmlns:a14="http://schemas.microsoft.com/office/drawing/2010/main">
-                <a:solidFill>
-                  <a:srgbClr val="FFFFFF"/>
-                </a:solidFill>
-              </a14:hiddenFill>
-            </a:ext>
-            <a:ext uri="{91240B29-F687-4F45-9708-019B960494DF}">
-              <a14:hiddenLine xmlns:a14="http://schemas.microsoft.com/office/drawing/2010/main" w="9525">
-                <a:solidFill>
-                  <a:srgbClr val="000000"/>
-                </a:solidFill>
-                <a:miter lim="800000"/>
-                <a:headEnd/>
-                <a:tailEnd/>
-              </a14:hiddenLine>
-            </a:ext>
-          </a:extLst>
         </p:spPr>
       </p:pic>
-      <p:pic>
-        <p:nvPicPr>
-          <p:cNvPr id="54" name="Graphic 24">
-            <a:extLst>
-              <a:ext uri="{FF2B5EF4-FFF2-40B4-BE49-F238E27FC236}">
-                <a16:creationId xmlns:a16="http://schemas.microsoft.com/office/drawing/2014/main" id="{0565F9CB-9F9E-E443-BF68-41C87611C350}"/>
-              </a:ext>
-            </a:extLst>
-          </p:cNvPr>
-          <p:cNvPicPr>
-            <a:picLocks noChangeAspect="1" noChangeArrowheads="1"/>
-          </p:cNvPicPr>
-          <p:nvPr/>
-        </p:nvPicPr>
-        <p:blipFill>
-          <a:blip r:embed="rId8">
-            <a:extLst>
-              <a:ext uri="{28A0092B-C50C-407E-A947-70E740481C1C}">
-                <a14:useLocalDpi xmlns:a14="http://schemas.microsoft.com/office/drawing/2010/main" val="0"/>
-              </a:ext>
-            </a:extLst>
-          </a:blip>
-          <a:srcRect/>
-          <a:stretch>
-            <a:fillRect/>
-          </a:stretch>
-        </p:blipFill>
-        <p:spPr bwMode="auto">
-          <a:xfrm>
-            <a:off x="2968407" y="2679806"/>
-            <a:ext cx="457200" cy="457200"/>
-          </a:xfrm>
-          <a:prstGeom prst="rect">
-            <a:avLst/>
-          </a:prstGeom>
-          <a:noFill/>
-          <a:ln>
-            <a:noFill/>
-          </a:ln>
-          <a:extLst>
-            <a:ext uri="{909E8E84-426E-40DD-AFC4-6F175D3DCCD1}">
-              <a14:hiddenFill xmlns:a14="http://schemas.microsoft.com/office/drawing/2010/main">
-                <a:solidFill>
-                  <a:srgbClr val="FFFFFF"/>
-                </a:solidFill>
-              </a14:hiddenFill>
-            </a:ext>
-            <a:ext uri="{91240B29-F687-4F45-9708-019B960494DF}">
-              <a14:hiddenLine xmlns:a14="http://schemas.microsoft.com/office/drawing/2010/main" w="9525">
-                <a:solidFill>
-                  <a:srgbClr val="000000"/>
-                </a:solidFill>
-                <a:miter lim="800000"/>
-                <a:headEnd/>
-                <a:tailEnd/>
-              </a14:hiddenLine>
-            </a:ext>
-          </a:extLst>
-        </p:spPr>
-      </p:pic>
-      <p:sp>
-        <p:nvSpPr>
-          <p:cNvPr id="55" name="TextBox 26">
-            <a:extLst>
-              <a:ext uri="{FF2B5EF4-FFF2-40B4-BE49-F238E27FC236}">
-                <a16:creationId xmlns:a16="http://schemas.microsoft.com/office/drawing/2014/main" id="{8C01A33B-B67C-0445-AA21-F3786470D6FF}"/>
-              </a:ext>
-            </a:extLst>
-          </p:cNvPr>
-          <p:cNvSpPr txBox="1">
-            <a:spLocks noChangeArrowheads="1"/>
-          </p:cNvSpPr>
-          <p:nvPr/>
-        </p:nvSpPr>
-        <p:spPr bwMode="auto">
-          <a:xfrm>
-            <a:off x="2679593" y="3119506"/>
-            <a:ext cx="969198" cy="430887"/>
-          </a:xfrm>
-          <a:prstGeom prst="rect">
-            <a:avLst/>
-          </a:prstGeom>
-          <a:noFill/>
-          <a:ln>
-            <a:noFill/>
-          </a:ln>
-          <a:extLst>
-            <a:ext uri="{909E8E84-426E-40DD-AFC4-6F175D3DCCD1}">
-              <a14:hiddenFill xmlns:a14="http://schemas.microsoft.com/office/drawing/2010/main">
-                <a:solidFill>
-                  <a:srgbClr val="FFFFFF"/>
-                </a:solidFill>
-              </a14:hiddenFill>
-            </a:ext>
-            <a:ext uri="{91240B29-F687-4F45-9708-019B960494DF}">
-              <a14:hiddenLine xmlns:a14="http://schemas.microsoft.com/office/drawing/2010/main" w="9525">
-                <a:solidFill>
-                  <a:srgbClr val="000000"/>
-                </a:solidFill>
-                <a:miter lim="800000"/>
-                <a:headEnd/>
-                <a:tailEnd/>
-              </a14:hiddenLine>
-            </a:ext>
-          </a:extLst>
-        </p:spPr>
-        <p:txBody>
-          <a:bodyPr wrap="square">
-            <a:spAutoFit/>
-          </a:bodyPr>
-          <a:lstStyle>
-            <a:lvl1pPr>
-              <a:defRPr>
-                <a:solidFill>
-                  <a:schemeClr val="tx1"/>
-                </a:solidFill>
-                <a:latin typeface="Calibri" panose="020F0502020204030204" pitchFamily="34" charset="0"/>
-              </a:defRPr>
-            </a:lvl1pPr>
-            <a:lvl2pPr marL="742950" indent="-285750">
-              <a:defRPr>
-                <a:solidFill>
-                  <a:schemeClr val="tx1"/>
-                </a:solidFill>
-                <a:latin typeface="Calibri" panose="020F0502020204030204" pitchFamily="34" charset="0"/>
-              </a:defRPr>
-            </a:lvl2pPr>
-            <a:lvl3pPr marL="1143000" indent="-228600">
-              <a:defRPr>
-                <a:solidFill>
-                  <a:schemeClr val="tx1"/>
-                </a:solidFill>
-                <a:latin typeface="Calibri" panose="020F0502020204030204" pitchFamily="34" charset="0"/>
-              </a:defRPr>
-            </a:lvl3pPr>
-            <a:lvl4pPr marL="1600200" indent="-228600">
-              <a:defRPr>
-                <a:solidFill>
-                  <a:schemeClr val="tx1"/>
-                </a:solidFill>
-                <a:latin typeface="Calibri" panose="020F0502020204030204" pitchFamily="34" charset="0"/>
-              </a:defRPr>
-            </a:lvl4pPr>
-            <a:lvl5pPr marL="2057400" indent="-228600">
-              <a:defRPr>
-                <a:solidFill>
-                  <a:schemeClr val="tx1"/>
-                </a:solidFill>
-                <a:latin typeface="Calibri" panose="020F0502020204030204" pitchFamily="34" charset="0"/>
-              </a:defRPr>
-            </a:lvl5pPr>
-            <a:lvl6pPr marL="2514600" indent="-228600" eaLnBrk="0" fontAlgn="base" hangingPunct="0">
-              <a:spcBef>
-                <a:spcPct val="0"/>
-              </a:spcBef>
-              <a:spcAft>
-                <a:spcPct val="0"/>
-              </a:spcAft>
-              <a:defRPr>
-                <a:solidFill>
-                  <a:schemeClr val="tx1"/>
-                </a:solidFill>
-                <a:latin typeface="Calibri" panose="020F0502020204030204" pitchFamily="34" charset="0"/>
-              </a:defRPr>
-            </a:lvl6pPr>
-            <a:lvl7pPr marL="2971800" indent="-228600" eaLnBrk="0" fontAlgn="base" hangingPunct="0">
-              <a:spcBef>
-                <a:spcPct val="0"/>
-              </a:spcBef>
-              <a:spcAft>
-                <a:spcPct val="0"/>
-              </a:spcAft>
-              <a:defRPr>
-                <a:solidFill>
-                  <a:schemeClr val="tx1"/>
-                </a:solidFill>
-                <a:latin typeface="Calibri" panose="020F0502020204030204" pitchFamily="34" charset="0"/>
-              </a:defRPr>
-            </a:lvl7pPr>
-            <a:lvl8pPr marL="3429000" indent="-228600" eaLnBrk="0" fontAlgn="base" hangingPunct="0">
-              <a:spcBef>
-                <a:spcPct val="0"/>
-              </a:spcBef>
-              <a:spcAft>
-                <a:spcPct val="0"/>
-              </a:spcAft>
-              <a:defRPr>
-                <a:solidFill>
-                  <a:schemeClr val="tx1"/>
-                </a:solidFill>
-                <a:latin typeface="Calibri" panose="020F0502020204030204" pitchFamily="34" charset="0"/>
-              </a:defRPr>
-            </a:lvl8pPr>
-            <a:lvl9pPr marL="3886200" indent="-228600" eaLnBrk="0" fontAlgn="base" hangingPunct="0">
-              <a:spcBef>
-                <a:spcPct val="0"/>
-              </a:spcBef>
-              <a:spcAft>
-                <a:spcPct val="0"/>
-              </a:spcAft>
-              <a:defRPr>
-                <a:solidFill>
-                  <a:schemeClr val="tx1"/>
-                </a:solidFill>
-                <a:latin typeface="Calibri" panose="020F0502020204030204" pitchFamily="34" charset="0"/>
-              </a:defRPr>
-            </a:lvl9pPr>
-          </a:lstStyle>
-          <a:p>
-            <a:pPr algn="ctr" eaLnBrk="1" hangingPunct="1"/>
-            <a:r>
-              <a:rPr lang="en-US" altLang="en-US" sz="1100" dirty="0">
-                <a:latin typeface="Arial" panose="020B0604020202020204" pitchFamily="34" charset="0"/>
-                <a:ea typeface="Amazon Ember" panose="020B0603020204020204" pitchFamily="34" charset="0"/>
-                <a:cs typeface="Arial" panose="020B0604020202020204" pitchFamily="34" charset="0"/>
-              </a:rPr>
-              <a:t>Regional Event Rules</a:t>
-            </a:r>
-          </a:p>
-        </p:txBody>
-      </p:sp>
-      <p:sp>
-        <p:nvSpPr>
-          <p:cNvPr id="60" name="TextBox 29">
-            <a:extLst>
-              <a:ext uri="{FF2B5EF4-FFF2-40B4-BE49-F238E27FC236}">
-                <a16:creationId xmlns:a16="http://schemas.microsoft.com/office/drawing/2014/main" id="{7256CFDB-E862-AB4F-AC9E-F667A8C5EADD}"/>
-              </a:ext>
-            </a:extLst>
-          </p:cNvPr>
-          <p:cNvSpPr txBox="1">
-            <a:spLocks noChangeArrowheads="1"/>
-          </p:cNvSpPr>
-          <p:nvPr/>
-        </p:nvSpPr>
-        <p:spPr bwMode="auto">
-          <a:xfrm>
-            <a:off x="10004467" y="1388565"/>
-            <a:ext cx="1062976" cy="430887"/>
-          </a:xfrm>
-          <a:prstGeom prst="rect">
-            <a:avLst/>
-          </a:prstGeom>
-          <a:noFill/>
-          <a:ln>
-            <a:noFill/>
-          </a:ln>
-          <a:extLst>
-            <a:ext uri="{909E8E84-426E-40DD-AFC4-6F175D3DCCD1}">
-              <a14:hiddenFill xmlns:a14="http://schemas.microsoft.com/office/drawing/2010/main">
-                <a:solidFill>
-                  <a:srgbClr val="FFFFFF"/>
-                </a:solidFill>
-              </a14:hiddenFill>
-            </a:ext>
-            <a:ext uri="{91240B29-F687-4F45-9708-019B960494DF}">
-              <a14:hiddenLine xmlns:a14="http://schemas.microsoft.com/office/drawing/2010/main" w="9525">
-                <a:solidFill>
-                  <a:srgbClr val="000000"/>
-                </a:solidFill>
-                <a:miter lim="800000"/>
-                <a:headEnd/>
-                <a:tailEnd/>
-              </a14:hiddenLine>
-            </a:ext>
-          </a:extLst>
-        </p:spPr>
-        <p:txBody>
-          <a:bodyPr wrap="square">
-            <a:spAutoFit/>
-          </a:bodyPr>
-          <a:lstStyle>
-            <a:lvl1pPr>
-              <a:defRPr>
-                <a:solidFill>
-                  <a:schemeClr val="tx1"/>
-                </a:solidFill>
-                <a:latin typeface="Calibri" panose="020F0502020204030204" pitchFamily="34" charset="0"/>
-              </a:defRPr>
-            </a:lvl1pPr>
-            <a:lvl2pPr marL="742950" indent="-285750">
-              <a:defRPr>
-                <a:solidFill>
-                  <a:schemeClr val="tx1"/>
-                </a:solidFill>
-                <a:latin typeface="Calibri" panose="020F0502020204030204" pitchFamily="34" charset="0"/>
-              </a:defRPr>
-            </a:lvl2pPr>
-            <a:lvl3pPr marL="1143000" indent="-228600">
-              <a:defRPr>
-                <a:solidFill>
-                  <a:schemeClr val="tx1"/>
-                </a:solidFill>
-                <a:latin typeface="Calibri" panose="020F0502020204030204" pitchFamily="34" charset="0"/>
-              </a:defRPr>
-            </a:lvl3pPr>
-            <a:lvl4pPr marL="1600200" indent="-228600">
-              <a:defRPr>
-                <a:solidFill>
-                  <a:schemeClr val="tx1"/>
-                </a:solidFill>
-                <a:latin typeface="Calibri" panose="020F0502020204030204" pitchFamily="34" charset="0"/>
-              </a:defRPr>
-            </a:lvl4pPr>
-            <a:lvl5pPr marL="2057400" indent="-228600">
-              <a:defRPr>
-                <a:solidFill>
-                  <a:schemeClr val="tx1"/>
-                </a:solidFill>
-                <a:latin typeface="Calibri" panose="020F0502020204030204" pitchFamily="34" charset="0"/>
-              </a:defRPr>
-            </a:lvl5pPr>
-            <a:lvl6pPr marL="2514600" indent="-228600" eaLnBrk="0" fontAlgn="base" hangingPunct="0">
-              <a:spcBef>
-                <a:spcPct val="0"/>
-              </a:spcBef>
-              <a:spcAft>
-                <a:spcPct val="0"/>
-              </a:spcAft>
-              <a:defRPr>
-                <a:solidFill>
-                  <a:schemeClr val="tx1"/>
-                </a:solidFill>
-                <a:latin typeface="Calibri" panose="020F0502020204030204" pitchFamily="34" charset="0"/>
-              </a:defRPr>
-            </a:lvl6pPr>
-            <a:lvl7pPr marL="2971800" indent="-228600" eaLnBrk="0" fontAlgn="base" hangingPunct="0">
-              <a:spcBef>
-                <a:spcPct val="0"/>
-              </a:spcBef>
-              <a:spcAft>
-                <a:spcPct val="0"/>
-              </a:spcAft>
-              <a:defRPr>
-                <a:solidFill>
-                  <a:schemeClr val="tx1"/>
-                </a:solidFill>
-                <a:latin typeface="Calibri" panose="020F0502020204030204" pitchFamily="34" charset="0"/>
-              </a:defRPr>
-            </a:lvl7pPr>
-            <a:lvl8pPr marL="3429000" indent="-228600" eaLnBrk="0" fontAlgn="base" hangingPunct="0">
-              <a:spcBef>
-                <a:spcPct val="0"/>
-              </a:spcBef>
-              <a:spcAft>
-                <a:spcPct val="0"/>
-              </a:spcAft>
-              <a:defRPr>
-                <a:solidFill>
-                  <a:schemeClr val="tx1"/>
-                </a:solidFill>
-                <a:latin typeface="Calibri" panose="020F0502020204030204" pitchFamily="34" charset="0"/>
-              </a:defRPr>
-            </a:lvl8pPr>
-            <a:lvl9pPr marL="3886200" indent="-228600" eaLnBrk="0" fontAlgn="base" hangingPunct="0">
-              <a:spcBef>
-                <a:spcPct val="0"/>
-              </a:spcBef>
-              <a:spcAft>
-                <a:spcPct val="0"/>
-              </a:spcAft>
-              <a:defRPr>
-                <a:solidFill>
-                  <a:schemeClr val="tx1"/>
-                </a:solidFill>
-                <a:latin typeface="Calibri" panose="020F0502020204030204" pitchFamily="34" charset="0"/>
-              </a:defRPr>
-            </a:lvl9pPr>
-          </a:lstStyle>
-          <a:p>
-            <a:pPr algn="ctr"/>
-            <a:r>
-              <a:rPr lang="en-US" altLang="en-US" sz="1100" dirty="0">
-                <a:latin typeface="Arial" panose="020B0604020202020204" pitchFamily="34" charset="0"/>
-                <a:ea typeface="Amazon Ember" panose="020B0603020204020204" pitchFamily="34" charset="0"/>
-                <a:cs typeface="Arial" panose="020B0604020202020204" pitchFamily="34" charset="0"/>
-              </a:rPr>
-              <a:t>Configuration </a:t>
-            </a:r>
-          </a:p>
-          <a:p>
-            <a:pPr algn="ctr"/>
-            <a:r>
-              <a:rPr lang="en-US" altLang="en-US" sz="1100" dirty="0">
-                <a:latin typeface="Arial" panose="020B0604020202020204" pitchFamily="34" charset="0"/>
-                <a:ea typeface="Amazon Ember" panose="020B0603020204020204" pitchFamily="34" charset="0"/>
-                <a:cs typeface="Arial" panose="020B0604020202020204" pitchFamily="34" charset="0"/>
-              </a:rPr>
-              <a:t>Role</a:t>
-            </a:r>
-          </a:p>
-        </p:txBody>
-      </p:sp>
-      <p:pic>
-        <p:nvPicPr>
-          <p:cNvPr id="61" name="Graphic 49">
-            <a:extLst>
-              <a:ext uri="{FF2B5EF4-FFF2-40B4-BE49-F238E27FC236}">
-                <a16:creationId xmlns:a16="http://schemas.microsoft.com/office/drawing/2014/main" id="{222F14F2-0D5F-3A49-B4BE-0AE368E5A3B3}"/>
-              </a:ext>
-            </a:extLst>
-          </p:cNvPr>
-          <p:cNvPicPr>
-            <a:picLocks noChangeAspect="1" noChangeArrowheads="1"/>
-          </p:cNvPicPr>
-          <p:nvPr/>
-        </p:nvPicPr>
-        <p:blipFill>
-          <a:blip r:embed="rId7">
-            <a:extLst>
-              <a:ext uri="{28A0092B-C50C-407E-A947-70E740481C1C}">
-                <a14:useLocalDpi xmlns:a14="http://schemas.microsoft.com/office/drawing/2010/main" val="0"/>
-              </a:ext>
-            </a:extLst>
-          </a:blip>
-          <a:srcRect/>
-          <a:stretch>
-            <a:fillRect/>
-          </a:stretch>
-        </p:blipFill>
-        <p:spPr bwMode="auto">
-          <a:xfrm>
-            <a:off x="10259833" y="1045968"/>
-            <a:ext cx="457200" cy="457200"/>
-          </a:xfrm>
-          <a:prstGeom prst="rect">
-            <a:avLst/>
-          </a:prstGeom>
-          <a:noFill/>
-          <a:ln>
-            <a:noFill/>
-          </a:ln>
-          <a:extLst>
-            <a:ext uri="{909E8E84-426E-40DD-AFC4-6F175D3DCCD1}">
-              <a14:hiddenFill xmlns:a14="http://schemas.microsoft.com/office/drawing/2010/main">
-                <a:solidFill>
-                  <a:srgbClr val="FFFFFF"/>
-                </a:solidFill>
-              </a14:hiddenFill>
-            </a:ext>
-            <a:ext uri="{91240B29-F687-4F45-9708-019B960494DF}">
-              <a14:hiddenLine xmlns:a14="http://schemas.microsoft.com/office/drawing/2010/main" w="9525">
-                <a:solidFill>
-                  <a:srgbClr val="000000"/>
-                </a:solidFill>
-                <a:miter lim="800000"/>
-                <a:headEnd/>
-                <a:tailEnd/>
-              </a14:hiddenLine>
-            </a:ext>
-          </a:extLst>
-        </p:spPr>
-      </p:pic>
-      <p:sp>
-        <p:nvSpPr>
-          <p:cNvPr id="132" name="Oval 131">
-            <a:extLst>
-              <a:ext uri="{FF2B5EF4-FFF2-40B4-BE49-F238E27FC236}">
-                <a16:creationId xmlns:a16="http://schemas.microsoft.com/office/drawing/2014/main" id="{E90E9980-B378-8B48-A029-3577A1108948}"/>
+      <p:sp>
+        <p:nvSpPr>
+          <p:cNvPr id="95" name="Oval 94">
+            <a:extLst>
+              <a:ext uri="{FF2B5EF4-FFF2-40B4-BE49-F238E27FC236}">
+                <a16:creationId xmlns:a16="http://schemas.microsoft.com/office/drawing/2014/main" id="{AD4975BB-DD6D-C54E-B125-5B4B36BCF8AC}"/>
               </a:ext>
             </a:extLst>
           </p:cNvPr>
@@ -5307,7 +5075,7 @@
         </p:nvSpPr>
         <p:spPr>
           <a:xfrm>
-            <a:off x="1272421" y="3853363"/>
+            <a:off x="8483102" y="2940371"/>
             <a:ext cx="253435" cy="212902"/>
           </a:xfrm>
           <a:prstGeom prst="ellipse">
@@ -5348,17 +5116,249 @@
                 <a:latin typeface="Arial" panose="020B0604020202020204" pitchFamily="34" charset="0"/>
                 <a:cs typeface="Arial" panose="020B0604020202020204" pitchFamily="34" charset="0"/>
               </a:rPr>
-              <a:t>1.2</a:t>
-            </a:r>
-          </a:p>
-        </p:txBody>
-      </p:sp>
-      <p:sp>
-        <p:nvSpPr>
-          <p:cNvPr id="136" name="Oval 135">
-            <a:extLst>
-              <a:ext uri="{FF2B5EF4-FFF2-40B4-BE49-F238E27FC236}">
-                <a16:creationId xmlns:a16="http://schemas.microsoft.com/office/drawing/2014/main" id="{8883E90E-2B69-9B42-B954-561E833F7F65}"/>
+              <a:t>2.1</a:t>
+            </a:r>
+          </a:p>
+        </p:txBody>
+      </p:sp>
+      <p:sp>
+        <p:nvSpPr>
+          <p:cNvPr id="96" name="TextBox 29">
+            <a:extLst>
+              <a:ext uri="{FF2B5EF4-FFF2-40B4-BE49-F238E27FC236}">
+                <a16:creationId xmlns:a16="http://schemas.microsoft.com/office/drawing/2014/main" id="{C618E77E-F039-1E4A-96DB-E5F160FF919B}"/>
+              </a:ext>
+            </a:extLst>
+          </p:cNvPr>
+          <p:cNvSpPr txBox="1">
+            <a:spLocks noChangeArrowheads="1"/>
+          </p:cNvSpPr>
+          <p:nvPr/>
+        </p:nvSpPr>
+        <p:spPr bwMode="auto">
+          <a:xfrm>
+            <a:off x="8346009" y="4235582"/>
+            <a:ext cx="1062976" cy="430887"/>
+          </a:xfrm>
+          <a:prstGeom prst="rect">
+            <a:avLst/>
+          </a:prstGeom>
+          <a:noFill/>
+          <a:ln>
+            <a:noFill/>
+          </a:ln>
+          <a:extLst>
+            <a:ext uri="{909E8E84-426E-40DD-AFC4-6F175D3DCCD1}">
+              <a14:hiddenFill xmlns:a14="http://schemas.microsoft.com/office/drawing/2010/main">
+                <a:solidFill>
+                  <a:srgbClr val="FFFFFF"/>
+                </a:solidFill>
+              </a14:hiddenFill>
+            </a:ext>
+            <a:ext uri="{91240B29-F687-4F45-9708-019B960494DF}">
+              <a14:hiddenLine xmlns:a14="http://schemas.microsoft.com/office/drawing/2010/main" w="9525">
+                <a:solidFill>
+                  <a:srgbClr val="000000"/>
+                </a:solidFill>
+                <a:miter lim="800000"/>
+                <a:headEnd/>
+                <a:tailEnd/>
+              </a14:hiddenLine>
+            </a:ext>
+          </a:extLst>
+        </p:spPr>
+        <p:txBody>
+          <a:bodyPr wrap="square">
+            <a:spAutoFit/>
+          </a:bodyPr>
+          <a:lstStyle>
+            <a:lvl1pPr>
+              <a:defRPr>
+                <a:solidFill>
+                  <a:schemeClr val="tx1"/>
+                </a:solidFill>
+                <a:latin typeface="Calibri" panose="020F0502020204030204" pitchFamily="34" charset="0"/>
+              </a:defRPr>
+            </a:lvl1pPr>
+            <a:lvl2pPr marL="742950" indent="-285750">
+              <a:defRPr>
+                <a:solidFill>
+                  <a:schemeClr val="tx1"/>
+                </a:solidFill>
+                <a:latin typeface="Calibri" panose="020F0502020204030204" pitchFamily="34" charset="0"/>
+              </a:defRPr>
+            </a:lvl2pPr>
+            <a:lvl3pPr marL="1143000" indent="-228600">
+              <a:defRPr>
+                <a:solidFill>
+                  <a:schemeClr val="tx1"/>
+                </a:solidFill>
+                <a:latin typeface="Calibri" panose="020F0502020204030204" pitchFamily="34" charset="0"/>
+              </a:defRPr>
+            </a:lvl3pPr>
+            <a:lvl4pPr marL="1600200" indent="-228600">
+              <a:defRPr>
+                <a:solidFill>
+                  <a:schemeClr val="tx1"/>
+                </a:solidFill>
+                <a:latin typeface="Calibri" panose="020F0502020204030204" pitchFamily="34" charset="0"/>
+              </a:defRPr>
+            </a:lvl4pPr>
+            <a:lvl5pPr marL="2057400" indent="-228600">
+              <a:defRPr>
+                <a:solidFill>
+                  <a:schemeClr val="tx1"/>
+                </a:solidFill>
+                <a:latin typeface="Calibri" panose="020F0502020204030204" pitchFamily="34" charset="0"/>
+              </a:defRPr>
+            </a:lvl5pPr>
+            <a:lvl6pPr marL="2514600" indent="-228600" eaLnBrk="0" fontAlgn="base" hangingPunct="0">
+              <a:spcBef>
+                <a:spcPct val="0"/>
+              </a:spcBef>
+              <a:spcAft>
+                <a:spcPct val="0"/>
+              </a:spcAft>
+              <a:defRPr>
+                <a:solidFill>
+                  <a:schemeClr val="tx1"/>
+                </a:solidFill>
+                <a:latin typeface="Calibri" panose="020F0502020204030204" pitchFamily="34" charset="0"/>
+              </a:defRPr>
+            </a:lvl6pPr>
+            <a:lvl7pPr marL="2971800" indent="-228600" eaLnBrk="0" fontAlgn="base" hangingPunct="0">
+              <a:spcBef>
+                <a:spcPct val="0"/>
+              </a:spcBef>
+              <a:spcAft>
+                <a:spcPct val="0"/>
+              </a:spcAft>
+              <a:defRPr>
+                <a:solidFill>
+                  <a:schemeClr val="tx1"/>
+                </a:solidFill>
+                <a:latin typeface="Calibri" panose="020F0502020204030204" pitchFamily="34" charset="0"/>
+              </a:defRPr>
+            </a:lvl7pPr>
+            <a:lvl8pPr marL="3429000" indent="-228600" eaLnBrk="0" fontAlgn="base" hangingPunct="0">
+              <a:spcBef>
+                <a:spcPct val="0"/>
+              </a:spcBef>
+              <a:spcAft>
+                <a:spcPct val="0"/>
+              </a:spcAft>
+              <a:defRPr>
+                <a:solidFill>
+                  <a:schemeClr val="tx1"/>
+                </a:solidFill>
+                <a:latin typeface="Calibri" panose="020F0502020204030204" pitchFamily="34" charset="0"/>
+              </a:defRPr>
+            </a:lvl8pPr>
+            <a:lvl9pPr marL="3886200" indent="-228600" eaLnBrk="0" fontAlgn="base" hangingPunct="0">
+              <a:spcBef>
+                <a:spcPct val="0"/>
+              </a:spcBef>
+              <a:spcAft>
+                <a:spcPct val="0"/>
+              </a:spcAft>
+              <a:defRPr>
+                <a:solidFill>
+                  <a:schemeClr val="tx1"/>
+                </a:solidFill>
+                <a:latin typeface="Calibri" panose="020F0502020204030204" pitchFamily="34" charset="0"/>
+              </a:defRPr>
+            </a:lvl9pPr>
+          </a:lstStyle>
+          <a:p>
+            <a:pPr algn="ctr"/>
+            <a:r>
+              <a:rPr lang="en-US" altLang="en-US" sz="1100" dirty="0">
+                <a:latin typeface="Arial" panose="020B0604020202020204" pitchFamily="34" charset="0"/>
+                <a:ea typeface="Amazon Ember" panose="020B0603020204020204" pitchFamily="34" charset="0"/>
+                <a:cs typeface="Arial" panose="020B0604020202020204" pitchFamily="34" charset="0"/>
+              </a:rPr>
+              <a:t>Configuration </a:t>
+            </a:r>
+          </a:p>
+          <a:p>
+            <a:pPr algn="ctr"/>
+            <a:r>
+              <a:rPr lang="en-US" altLang="en-US" sz="1100" dirty="0">
+                <a:latin typeface="Arial" panose="020B0604020202020204" pitchFamily="34" charset="0"/>
+                <a:ea typeface="Amazon Ember" panose="020B0603020204020204" pitchFamily="34" charset="0"/>
+                <a:cs typeface="Arial" panose="020B0604020202020204" pitchFamily="34" charset="0"/>
+              </a:rPr>
+              <a:t>Role</a:t>
+            </a:r>
+          </a:p>
+        </p:txBody>
+      </p:sp>
+      <p:pic>
+        <p:nvPicPr>
+          <p:cNvPr id="97" name="Graphic 49">
+            <a:extLst>
+              <a:ext uri="{FF2B5EF4-FFF2-40B4-BE49-F238E27FC236}">
+                <a16:creationId xmlns:a16="http://schemas.microsoft.com/office/drawing/2014/main" id="{142C67C1-85D4-884F-8467-EC8CEA4D39A7}"/>
+              </a:ext>
+            </a:extLst>
+          </p:cNvPr>
+          <p:cNvPicPr>
+            <a:picLocks noChangeAspect="1" noChangeArrowheads="1"/>
+          </p:cNvPicPr>
+          <p:nvPr/>
+        </p:nvPicPr>
+        <p:blipFill>
+          <a:blip r:embed="rId7">
+            <a:extLst>
+              <a:ext uri="{28A0092B-C50C-407E-A947-70E740481C1C}">
+                <a14:useLocalDpi xmlns:a14="http://schemas.microsoft.com/office/drawing/2010/main" val="0"/>
+              </a:ext>
+            </a:extLst>
+          </a:blip>
+          <a:srcRect/>
+          <a:stretch>
+            <a:fillRect/>
+          </a:stretch>
+        </p:blipFill>
+        <p:spPr bwMode="auto">
+          <a:xfrm>
+            <a:off x="8601375" y="3892985"/>
+            <a:ext cx="457200" cy="457200"/>
+          </a:xfrm>
+          <a:prstGeom prst="rect">
+            <a:avLst/>
+          </a:prstGeom>
+          <a:noFill/>
+          <a:ln>
+            <a:noFill/>
+          </a:ln>
+          <a:extLst>
+            <a:ext uri="{909E8E84-426E-40DD-AFC4-6F175D3DCCD1}">
+              <a14:hiddenFill xmlns:a14="http://schemas.microsoft.com/office/drawing/2010/main">
+                <a:solidFill>
+                  <a:srgbClr val="FFFFFF"/>
+                </a:solidFill>
+              </a14:hiddenFill>
+            </a:ext>
+            <a:ext uri="{91240B29-F687-4F45-9708-019B960494DF}">
+              <a14:hiddenLine xmlns:a14="http://schemas.microsoft.com/office/drawing/2010/main" w="9525">
+                <a:solidFill>
+                  <a:srgbClr val="000000"/>
+                </a:solidFill>
+                <a:miter lim="800000"/>
+                <a:headEnd/>
+                <a:tailEnd/>
+              </a14:hiddenLine>
+            </a:ext>
+          </a:extLst>
+        </p:spPr>
+      </p:pic>
+      <p:sp>
+        <p:nvSpPr>
+          <p:cNvPr id="98" name="Oval 97">
+            <a:extLst>
+              <a:ext uri="{FF2B5EF4-FFF2-40B4-BE49-F238E27FC236}">
+                <a16:creationId xmlns:a16="http://schemas.microsoft.com/office/drawing/2014/main" id="{CF03D907-C303-E248-85D2-6E9BA760D360}"/>
               </a:ext>
             </a:extLst>
           </p:cNvPr>
@@ -5367,7 +5367,7 @@
         </p:nvSpPr>
         <p:spPr>
           <a:xfrm>
-            <a:off x="10090876" y="1104008"/>
+            <a:off x="8451399" y="3905592"/>
             <a:ext cx="253435" cy="212902"/>
           </a:xfrm>
           <a:prstGeom prst="ellipse">
@@ -5415,10 +5415,10 @@
       </p:sp>
       <p:sp>
         <p:nvSpPr>
-          <p:cNvPr id="51" name="Rectangle 50">
-            <a:extLst>
-              <a:ext uri="{FF2B5EF4-FFF2-40B4-BE49-F238E27FC236}">
-                <a16:creationId xmlns:a16="http://schemas.microsoft.com/office/drawing/2014/main" id="{94E4C51E-7A98-6F4B-822A-7AA7100FCB0A}"/>
+          <p:cNvPr id="99" name="Rectangle 98">
+            <a:extLst>
+              <a:ext uri="{FF2B5EF4-FFF2-40B4-BE49-F238E27FC236}">
+                <a16:creationId xmlns:a16="http://schemas.microsoft.com/office/drawing/2014/main" id="{4B2670A8-11CF-694C-B441-E690B7BB0CAA}"/>
               </a:ext>
             </a:extLst>
           </p:cNvPr>
@@ -5427,698 +5427,7 @@
         </p:nvSpPr>
         <p:spPr>
           <a:xfrm>
-            <a:off x="9851790" y="1835502"/>
-            <a:ext cx="1236216" cy="1399834"/>
-          </a:xfrm>
-          <a:prstGeom prst="rect">
-            <a:avLst/>
-          </a:prstGeom>
-          <a:noFill/>
-          <a:ln w="12700">
-            <a:solidFill>
-              <a:schemeClr val="tx1"/>
-            </a:solidFill>
-            <a:prstDash val="dash"/>
-          </a:ln>
-        </p:spPr>
-        <p:style>
-          <a:lnRef idx="2">
-            <a:schemeClr val="accent1">
-              <a:shade val="50000"/>
-            </a:schemeClr>
-          </a:lnRef>
-          <a:fillRef idx="1">
-            <a:schemeClr val="accent1"/>
-          </a:fillRef>
-          <a:effectRef idx="0">
-            <a:schemeClr val="accent1"/>
-          </a:effectRef>
-          <a:fontRef idx="minor">
-            <a:schemeClr val="lt1"/>
-          </a:fontRef>
-        </p:style>
-        <p:txBody>
-          <a:bodyPr rot="0" spcFirstLastPara="0" vertOverflow="overflow" horzOverflow="overflow" vert="horz" wrap="square" lIns="91440" tIns="0" rIns="91440" bIns="45720" numCol="1" spcCol="0" rtlCol="0" fromWordArt="0" anchor="t" anchorCtr="0" forceAA="0" compatLnSpc="1">
-            <a:noAutofit/>
-          </a:bodyPr>
-          <a:lstStyle/>
-          <a:p>
-            <a:r>
-              <a:rPr lang="en-US" sz="1100" b="1" dirty="0">
-                <a:solidFill>
-                  <a:schemeClr val="tx1"/>
-                </a:solidFill>
-                <a:latin typeface="Arial" panose="020B0604020202020204" pitchFamily="34" charset="0"/>
-                <a:cs typeface="Arial" panose="020B0604020202020204" pitchFamily="34" charset="0"/>
-              </a:rPr>
-              <a:t>Global</a:t>
-            </a:r>
-          </a:p>
-        </p:txBody>
-      </p:sp>
-      <p:sp>
-        <p:nvSpPr>
-          <p:cNvPr id="90" name="Rectangle 89">
-            <a:extLst>
-              <a:ext uri="{FF2B5EF4-FFF2-40B4-BE49-F238E27FC236}">
-                <a16:creationId xmlns:a16="http://schemas.microsoft.com/office/drawing/2014/main" id="{47B93F37-6BED-7842-BCB8-8257FA6836B8}"/>
-              </a:ext>
-            </a:extLst>
-          </p:cNvPr>
-          <p:cNvSpPr/>
-          <p:nvPr/>
-        </p:nvSpPr>
-        <p:spPr>
-          <a:xfrm>
-            <a:off x="7896701" y="3577177"/>
-            <a:ext cx="3455224" cy="2750796"/>
-          </a:xfrm>
-          <a:prstGeom prst="rect">
-            <a:avLst/>
-          </a:prstGeom>
-          <a:noFill/>
-          <a:ln w="12700">
-            <a:solidFill>
-              <a:schemeClr val="tx1"/>
-            </a:solidFill>
-            <a:prstDash val="solid"/>
-          </a:ln>
-        </p:spPr>
-        <p:style>
-          <a:lnRef idx="2">
-            <a:schemeClr val="accent1">
-              <a:shade val="50000"/>
-            </a:schemeClr>
-          </a:lnRef>
-          <a:fillRef idx="1">
-            <a:schemeClr val="accent1"/>
-          </a:fillRef>
-          <a:effectRef idx="0">
-            <a:schemeClr val="accent1"/>
-          </a:effectRef>
-          <a:fontRef idx="minor">
-            <a:schemeClr val="lt1"/>
-          </a:fontRef>
-        </p:style>
-        <p:txBody>
-          <a:bodyPr rot="0" spcFirstLastPara="0" vertOverflow="overflow" horzOverflow="overflow" vert="horz" wrap="square" lIns="91440" tIns="91440" rIns="91440" bIns="45720" numCol="1" spcCol="0" rtlCol="0" fromWordArt="0" anchor="t" anchorCtr="0" forceAA="0" compatLnSpc="1">
-            <a:prstTxWarp prst="textNoShape">
-              <a:avLst/>
-            </a:prstTxWarp>
-            <a:noAutofit/>
-          </a:bodyPr>
-          <a:lstStyle/>
-          <a:p>
-            <a:pPr algn="ctr"/>
-            <a:r>
-              <a:rPr lang="en-US" sz="1400" dirty="0">
-                <a:solidFill>
-                  <a:schemeClr val="tx1"/>
-                </a:solidFill>
-                <a:latin typeface="Arial" panose="020B0604020202020204" pitchFamily="34" charset="0"/>
-                <a:cs typeface="Arial" panose="020B0604020202020204" pitchFamily="34" charset="0"/>
-              </a:rPr>
-              <a:t>All Existing and Future </a:t>
-            </a:r>
-          </a:p>
-          <a:p>
-            <a:pPr algn="ctr"/>
-            <a:r>
-              <a:rPr lang="en-US" sz="1400" dirty="0">
-                <a:solidFill>
-                  <a:schemeClr val="tx1"/>
-                </a:solidFill>
-                <a:latin typeface="Arial" panose="020B0604020202020204" pitchFamily="34" charset="0"/>
-                <a:cs typeface="Arial" panose="020B0604020202020204" pitchFamily="34" charset="0"/>
-              </a:rPr>
-              <a:t>Organization Member Accounts</a:t>
-            </a:r>
-          </a:p>
-        </p:txBody>
-      </p:sp>
-      <p:sp>
-        <p:nvSpPr>
-          <p:cNvPr id="91" name="Oval 90">
-            <a:extLst>
-              <a:ext uri="{FF2B5EF4-FFF2-40B4-BE49-F238E27FC236}">
-                <a16:creationId xmlns:a16="http://schemas.microsoft.com/office/drawing/2014/main" id="{4F6D3A5E-6D06-304A-97F5-69FDBDFDA450}"/>
-              </a:ext>
-            </a:extLst>
-          </p:cNvPr>
-          <p:cNvSpPr/>
-          <p:nvPr/>
-        </p:nvSpPr>
-        <p:spPr>
-          <a:xfrm>
-            <a:off x="7923154" y="3599017"/>
-            <a:ext cx="253435" cy="212902"/>
-          </a:xfrm>
-          <a:prstGeom prst="ellipse">
-            <a:avLst/>
-          </a:prstGeom>
-          <a:solidFill>
-            <a:schemeClr val="tx1"/>
-          </a:solidFill>
-          <a:ln>
-            <a:solidFill>
-              <a:schemeClr val="tx1"/>
-            </a:solidFill>
-          </a:ln>
-        </p:spPr>
-        <p:style>
-          <a:lnRef idx="2">
-            <a:schemeClr val="accent1">
-              <a:shade val="50000"/>
-            </a:schemeClr>
-          </a:lnRef>
-          <a:fillRef idx="1">
-            <a:schemeClr val="accent1"/>
-          </a:fillRef>
-          <a:effectRef idx="0">
-            <a:schemeClr val="accent1"/>
-          </a:effectRef>
-          <a:fontRef idx="minor">
-            <a:schemeClr val="lt1"/>
-          </a:fontRef>
-        </p:style>
-        <p:txBody>
-          <a:bodyPr lIns="0" tIns="0" rIns="0" bIns="0" rtlCol="0" anchor="ctr"/>
-          <a:lstStyle/>
-          <a:p>
-            <a:pPr algn="ctr"/>
-            <a:r>
-              <a:rPr lang="en-US" sz="800" dirty="0"/>
-              <a:t>3.0</a:t>
-            </a:r>
-          </a:p>
-        </p:txBody>
-      </p:sp>
-      <p:sp>
-        <p:nvSpPr>
-          <p:cNvPr id="92" name="Rectangle 91">
-            <a:extLst>
-              <a:ext uri="{FF2B5EF4-FFF2-40B4-BE49-F238E27FC236}">
-                <a16:creationId xmlns:a16="http://schemas.microsoft.com/office/drawing/2014/main" id="{00FDA628-A4EA-EB48-92B2-27CAC6AB8DD3}"/>
-              </a:ext>
-            </a:extLst>
-          </p:cNvPr>
-          <p:cNvSpPr/>
-          <p:nvPr/>
-        </p:nvSpPr>
-        <p:spPr>
-          <a:xfrm>
-            <a:off x="7995097" y="4185150"/>
-            <a:ext cx="3260622" cy="1997165"/>
-          </a:xfrm>
-          <a:prstGeom prst="rect">
-            <a:avLst/>
-          </a:prstGeom>
-          <a:noFill/>
-          <a:ln w="12700">
-            <a:solidFill>
-              <a:schemeClr val="tx1"/>
-            </a:solidFill>
-            <a:prstDash val="dash"/>
-          </a:ln>
-        </p:spPr>
-        <p:style>
-          <a:lnRef idx="2">
-            <a:schemeClr val="accent1">
-              <a:shade val="50000"/>
-            </a:schemeClr>
-          </a:lnRef>
-          <a:fillRef idx="1">
-            <a:schemeClr val="accent1"/>
-          </a:fillRef>
-          <a:effectRef idx="0">
-            <a:schemeClr val="accent1"/>
-          </a:effectRef>
-          <a:fontRef idx="minor">
-            <a:schemeClr val="lt1"/>
-          </a:fontRef>
-        </p:style>
-        <p:txBody>
-          <a:bodyPr rot="0" spcFirstLastPara="0" vertOverflow="overflow" horzOverflow="overflow" vert="horz" wrap="square" lIns="91440" tIns="0" rIns="91440" bIns="45720" numCol="1" spcCol="0" rtlCol="0" fromWordArt="0" anchor="t" anchorCtr="0" forceAA="0" compatLnSpc="1">
-            <a:prstTxWarp prst="textNoShape">
-              <a:avLst/>
-            </a:prstTxWarp>
-            <a:noAutofit/>
-          </a:bodyPr>
-          <a:lstStyle/>
-          <a:p>
-            <a:r>
-              <a:rPr lang="en-US" sz="1200" b="1" dirty="0">
-                <a:solidFill>
-                  <a:schemeClr val="tx1"/>
-                </a:solidFill>
-              </a:rPr>
-              <a:t>Home-region</a:t>
-            </a:r>
-          </a:p>
-        </p:txBody>
-      </p:sp>
-      <p:sp>
-        <p:nvSpPr>
-          <p:cNvPr id="93" name="TextBox 92">
-            <a:extLst>
-              <a:ext uri="{FF2B5EF4-FFF2-40B4-BE49-F238E27FC236}">
-                <a16:creationId xmlns:a16="http://schemas.microsoft.com/office/drawing/2014/main" id="{CDCCCE1E-DD4E-3D4B-BE03-47129D861225}"/>
-              </a:ext>
-            </a:extLst>
-          </p:cNvPr>
-          <p:cNvSpPr txBox="1"/>
-          <p:nvPr/>
-        </p:nvSpPr>
-        <p:spPr>
-          <a:xfrm>
-            <a:off x="8176490" y="4922992"/>
-            <a:ext cx="1209667" cy="430887"/>
-          </a:xfrm>
-          <a:prstGeom prst="rect">
-            <a:avLst/>
-          </a:prstGeom>
-          <a:noFill/>
-        </p:spPr>
-        <p:txBody>
-          <a:bodyPr wrap="square" rtlCol="0">
-            <a:spAutoFit/>
-          </a:bodyPr>
-          <a:lstStyle/>
-          <a:p>
-            <a:pPr algn="ctr"/>
-            <a:r>
-              <a:rPr lang="en-US" sz="1100" dirty="0">
-                <a:latin typeface="Arial" panose="020B0604020202020204" pitchFamily="34" charset="0"/>
-                <a:cs typeface="Arial" panose="020B0604020202020204" pitchFamily="34" charset="0"/>
-              </a:rPr>
-              <a:t>AWS CloudFormation</a:t>
-            </a:r>
-          </a:p>
-        </p:txBody>
-      </p:sp>
-      <p:pic>
-        <p:nvPicPr>
-          <p:cNvPr id="94" name="Graphic 93">
-            <a:extLst>
-              <a:ext uri="{FF2B5EF4-FFF2-40B4-BE49-F238E27FC236}">
-                <a16:creationId xmlns:a16="http://schemas.microsoft.com/office/drawing/2014/main" id="{31D7640F-4E48-1D4E-B8F0-CC6DBC330519}"/>
-              </a:ext>
-            </a:extLst>
-          </p:cNvPr>
-          <p:cNvPicPr>
-            <a:picLocks noChangeAspect="1"/>
-          </p:cNvPicPr>
-          <p:nvPr/>
-        </p:nvPicPr>
-        <p:blipFill>
-          <a:blip r:embed="rId5">
-            <a:extLst>
-              <a:ext uri="{96DAC541-7B7A-43D3-8B79-37D633B846F1}">
-                <asvg:svgBlip xmlns:asvg="http://schemas.microsoft.com/office/drawing/2016/SVG/main" r:embed="rId6"/>
-              </a:ext>
-            </a:extLst>
-          </a:blip>
-          <a:stretch>
-            <a:fillRect/>
-          </a:stretch>
-        </p:blipFill>
-        <p:spPr>
-          <a:xfrm>
-            <a:off x="8555831" y="4469389"/>
-            <a:ext cx="457200" cy="457200"/>
-          </a:xfrm>
-          <a:prstGeom prst="rect">
-            <a:avLst/>
-          </a:prstGeom>
-        </p:spPr>
-      </p:pic>
-      <p:sp>
-        <p:nvSpPr>
-          <p:cNvPr id="95" name="Oval 94">
-            <a:extLst>
-              <a:ext uri="{FF2B5EF4-FFF2-40B4-BE49-F238E27FC236}">
-                <a16:creationId xmlns:a16="http://schemas.microsoft.com/office/drawing/2014/main" id="{AD4975BB-DD6D-C54E-B125-5B4B36BCF8AC}"/>
-              </a:ext>
-            </a:extLst>
-          </p:cNvPr>
-          <p:cNvSpPr/>
-          <p:nvPr/>
-        </p:nvSpPr>
-        <p:spPr>
-          <a:xfrm>
-            <a:off x="8571057" y="4477896"/>
-            <a:ext cx="253435" cy="212902"/>
-          </a:xfrm>
-          <a:prstGeom prst="ellipse">
-            <a:avLst/>
-          </a:prstGeom>
-          <a:solidFill>
-            <a:schemeClr val="tx1"/>
-          </a:solidFill>
-          <a:ln>
-            <a:solidFill>
-              <a:schemeClr val="tx1"/>
-            </a:solidFill>
-          </a:ln>
-        </p:spPr>
-        <p:style>
-          <a:lnRef idx="2">
-            <a:schemeClr val="accent1">
-              <a:shade val="50000"/>
-            </a:schemeClr>
-          </a:lnRef>
-          <a:fillRef idx="1">
-            <a:schemeClr val="accent1"/>
-          </a:fillRef>
-          <a:effectRef idx="0">
-            <a:schemeClr val="accent1"/>
-          </a:effectRef>
-          <a:fontRef idx="minor">
-            <a:schemeClr val="lt1"/>
-          </a:fontRef>
-        </p:style>
-        <p:txBody>
-          <a:bodyPr lIns="0" tIns="0" rIns="0" bIns="0" rtlCol="0" anchor="ctr"/>
-          <a:lstStyle/>
-          <a:p>
-            <a:pPr algn="ctr"/>
-            <a:r>
-              <a:rPr lang="en-US" sz="800" dirty="0">
-                <a:latin typeface="Arial" panose="020B0604020202020204" pitchFamily="34" charset="0"/>
-                <a:cs typeface="Arial" panose="020B0604020202020204" pitchFamily="34" charset="0"/>
-              </a:rPr>
-              <a:t>3.1</a:t>
-            </a:r>
-          </a:p>
-        </p:txBody>
-      </p:sp>
-      <p:sp>
-        <p:nvSpPr>
-          <p:cNvPr id="96" name="TextBox 29">
-            <a:extLst>
-              <a:ext uri="{FF2B5EF4-FFF2-40B4-BE49-F238E27FC236}">
-                <a16:creationId xmlns:a16="http://schemas.microsoft.com/office/drawing/2014/main" id="{C618E77E-F039-1E4A-96DB-E5F160FF919B}"/>
-              </a:ext>
-            </a:extLst>
-          </p:cNvPr>
-          <p:cNvSpPr txBox="1">
-            <a:spLocks noChangeArrowheads="1"/>
-          </p:cNvSpPr>
-          <p:nvPr/>
-        </p:nvSpPr>
-        <p:spPr bwMode="auto">
-          <a:xfrm>
-            <a:off x="8295095" y="5683869"/>
-            <a:ext cx="1062976" cy="430887"/>
-          </a:xfrm>
-          <a:prstGeom prst="rect">
-            <a:avLst/>
-          </a:prstGeom>
-          <a:noFill/>
-          <a:ln>
-            <a:noFill/>
-          </a:ln>
-          <a:extLst>
-            <a:ext uri="{909E8E84-426E-40DD-AFC4-6F175D3DCCD1}">
-              <a14:hiddenFill xmlns:a14="http://schemas.microsoft.com/office/drawing/2010/main">
-                <a:solidFill>
-                  <a:srgbClr val="FFFFFF"/>
-                </a:solidFill>
-              </a14:hiddenFill>
-            </a:ext>
-            <a:ext uri="{91240B29-F687-4F45-9708-019B960494DF}">
-              <a14:hiddenLine xmlns:a14="http://schemas.microsoft.com/office/drawing/2010/main" w="9525">
-                <a:solidFill>
-                  <a:srgbClr val="000000"/>
-                </a:solidFill>
-                <a:miter lim="800000"/>
-                <a:headEnd/>
-                <a:tailEnd/>
-              </a14:hiddenLine>
-            </a:ext>
-          </a:extLst>
-        </p:spPr>
-        <p:txBody>
-          <a:bodyPr wrap="square">
-            <a:spAutoFit/>
-          </a:bodyPr>
-          <a:lstStyle>
-            <a:lvl1pPr>
-              <a:defRPr>
-                <a:solidFill>
-                  <a:schemeClr val="tx1"/>
-                </a:solidFill>
-                <a:latin typeface="Calibri" panose="020F0502020204030204" pitchFamily="34" charset="0"/>
-              </a:defRPr>
-            </a:lvl1pPr>
-            <a:lvl2pPr marL="742950" indent="-285750">
-              <a:defRPr>
-                <a:solidFill>
-                  <a:schemeClr val="tx1"/>
-                </a:solidFill>
-                <a:latin typeface="Calibri" panose="020F0502020204030204" pitchFamily="34" charset="0"/>
-              </a:defRPr>
-            </a:lvl2pPr>
-            <a:lvl3pPr marL="1143000" indent="-228600">
-              <a:defRPr>
-                <a:solidFill>
-                  <a:schemeClr val="tx1"/>
-                </a:solidFill>
-                <a:latin typeface="Calibri" panose="020F0502020204030204" pitchFamily="34" charset="0"/>
-              </a:defRPr>
-            </a:lvl3pPr>
-            <a:lvl4pPr marL="1600200" indent="-228600">
-              <a:defRPr>
-                <a:solidFill>
-                  <a:schemeClr val="tx1"/>
-                </a:solidFill>
-                <a:latin typeface="Calibri" panose="020F0502020204030204" pitchFamily="34" charset="0"/>
-              </a:defRPr>
-            </a:lvl4pPr>
-            <a:lvl5pPr marL="2057400" indent="-228600">
-              <a:defRPr>
-                <a:solidFill>
-                  <a:schemeClr val="tx1"/>
-                </a:solidFill>
-                <a:latin typeface="Calibri" panose="020F0502020204030204" pitchFamily="34" charset="0"/>
-              </a:defRPr>
-            </a:lvl5pPr>
-            <a:lvl6pPr marL="2514600" indent="-228600" eaLnBrk="0" fontAlgn="base" hangingPunct="0">
-              <a:spcBef>
-                <a:spcPct val="0"/>
-              </a:spcBef>
-              <a:spcAft>
-                <a:spcPct val="0"/>
-              </a:spcAft>
-              <a:defRPr>
-                <a:solidFill>
-                  <a:schemeClr val="tx1"/>
-                </a:solidFill>
-                <a:latin typeface="Calibri" panose="020F0502020204030204" pitchFamily="34" charset="0"/>
-              </a:defRPr>
-            </a:lvl6pPr>
-            <a:lvl7pPr marL="2971800" indent="-228600" eaLnBrk="0" fontAlgn="base" hangingPunct="0">
-              <a:spcBef>
-                <a:spcPct val="0"/>
-              </a:spcBef>
-              <a:spcAft>
-                <a:spcPct val="0"/>
-              </a:spcAft>
-              <a:defRPr>
-                <a:solidFill>
-                  <a:schemeClr val="tx1"/>
-                </a:solidFill>
-                <a:latin typeface="Calibri" panose="020F0502020204030204" pitchFamily="34" charset="0"/>
-              </a:defRPr>
-            </a:lvl7pPr>
-            <a:lvl8pPr marL="3429000" indent="-228600" eaLnBrk="0" fontAlgn="base" hangingPunct="0">
-              <a:spcBef>
-                <a:spcPct val="0"/>
-              </a:spcBef>
-              <a:spcAft>
-                <a:spcPct val="0"/>
-              </a:spcAft>
-              <a:defRPr>
-                <a:solidFill>
-                  <a:schemeClr val="tx1"/>
-                </a:solidFill>
-                <a:latin typeface="Calibri" panose="020F0502020204030204" pitchFamily="34" charset="0"/>
-              </a:defRPr>
-            </a:lvl8pPr>
-            <a:lvl9pPr marL="3886200" indent="-228600" eaLnBrk="0" fontAlgn="base" hangingPunct="0">
-              <a:spcBef>
-                <a:spcPct val="0"/>
-              </a:spcBef>
-              <a:spcAft>
-                <a:spcPct val="0"/>
-              </a:spcAft>
-              <a:defRPr>
-                <a:solidFill>
-                  <a:schemeClr val="tx1"/>
-                </a:solidFill>
-                <a:latin typeface="Calibri" panose="020F0502020204030204" pitchFamily="34" charset="0"/>
-              </a:defRPr>
-            </a:lvl9pPr>
-          </a:lstStyle>
-          <a:p>
-            <a:pPr algn="ctr"/>
-            <a:r>
-              <a:rPr lang="en-US" altLang="en-US" sz="1100" dirty="0">
-                <a:latin typeface="Arial" panose="020B0604020202020204" pitchFamily="34" charset="0"/>
-                <a:ea typeface="Amazon Ember" panose="020B0603020204020204" pitchFamily="34" charset="0"/>
-                <a:cs typeface="Arial" panose="020B0604020202020204" pitchFamily="34" charset="0"/>
-              </a:rPr>
-              <a:t>Configuration </a:t>
-            </a:r>
-          </a:p>
-          <a:p>
-            <a:pPr algn="ctr"/>
-            <a:r>
-              <a:rPr lang="en-US" altLang="en-US" sz="1100" dirty="0">
-                <a:latin typeface="Arial" panose="020B0604020202020204" pitchFamily="34" charset="0"/>
-                <a:ea typeface="Amazon Ember" panose="020B0603020204020204" pitchFamily="34" charset="0"/>
-                <a:cs typeface="Arial" panose="020B0604020202020204" pitchFamily="34" charset="0"/>
-              </a:rPr>
-              <a:t>Role</a:t>
-            </a:r>
-          </a:p>
-        </p:txBody>
-      </p:sp>
-      <p:pic>
-        <p:nvPicPr>
-          <p:cNvPr id="97" name="Graphic 49">
-            <a:extLst>
-              <a:ext uri="{FF2B5EF4-FFF2-40B4-BE49-F238E27FC236}">
-                <a16:creationId xmlns:a16="http://schemas.microsoft.com/office/drawing/2014/main" id="{142C67C1-85D4-884F-8467-EC8CEA4D39A7}"/>
-              </a:ext>
-            </a:extLst>
-          </p:cNvPr>
-          <p:cNvPicPr>
-            <a:picLocks noChangeAspect="1" noChangeArrowheads="1"/>
-          </p:cNvPicPr>
-          <p:nvPr/>
-        </p:nvPicPr>
-        <p:blipFill>
-          <a:blip r:embed="rId7">
-            <a:extLst>
-              <a:ext uri="{28A0092B-C50C-407E-A947-70E740481C1C}">
-                <a14:useLocalDpi xmlns:a14="http://schemas.microsoft.com/office/drawing/2010/main" val="0"/>
-              </a:ext>
-            </a:extLst>
-          </a:blip>
-          <a:srcRect/>
-          <a:stretch>
-            <a:fillRect/>
-          </a:stretch>
-        </p:blipFill>
-        <p:spPr bwMode="auto">
-          <a:xfrm>
-            <a:off x="8550461" y="5341272"/>
-            <a:ext cx="457200" cy="457200"/>
-          </a:xfrm>
-          <a:prstGeom prst="rect">
-            <a:avLst/>
-          </a:prstGeom>
-          <a:noFill/>
-          <a:ln>
-            <a:noFill/>
-          </a:ln>
-          <a:extLst>
-            <a:ext uri="{909E8E84-426E-40DD-AFC4-6F175D3DCCD1}">
-              <a14:hiddenFill xmlns:a14="http://schemas.microsoft.com/office/drawing/2010/main">
-                <a:solidFill>
-                  <a:srgbClr val="FFFFFF"/>
-                </a:solidFill>
-              </a14:hiddenFill>
-            </a:ext>
-            <a:ext uri="{91240B29-F687-4F45-9708-019B960494DF}">
-              <a14:hiddenLine xmlns:a14="http://schemas.microsoft.com/office/drawing/2010/main" w="9525">
-                <a:solidFill>
-                  <a:srgbClr val="000000"/>
-                </a:solidFill>
-                <a:miter lim="800000"/>
-                <a:headEnd/>
-                <a:tailEnd/>
-              </a14:hiddenLine>
-            </a:ext>
-          </a:extLst>
-        </p:spPr>
-      </p:pic>
-      <p:sp>
-        <p:nvSpPr>
-          <p:cNvPr id="98" name="Oval 97">
-            <a:extLst>
-              <a:ext uri="{FF2B5EF4-FFF2-40B4-BE49-F238E27FC236}">
-                <a16:creationId xmlns:a16="http://schemas.microsoft.com/office/drawing/2014/main" id="{CF03D907-C303-E248-85D2-6E9BA760D360}"/>
-              </a:ext>
-            </a:extLst>
-          </p:cNvPr>
-          <p:cNvSpPr/>
-          <p:nvPr/>
-        </p:nvSpPr>
-        <p:spPr>
-          <a:xfrm>
-            <a:off x="8381504" y="5399312"/>
-            <a:ext cx="253435" cy="212902"/>
-          </a:xfrm>
-          <a:prstGeom prst="ellipse">
-            <a:avLst/>
-          </a:prstGeom>
-          <a:solidFill>
-            <a:schemeClr val="tx1"/>
-          </a:solidFill>
-          <a:ln>
-            <a:solidFill>
-              <a:schemeClr val="tx1"/>
-            </a:solidFill>
-          </a:ln>
-        </p:spPr>
-        <p:style>
-          <a:lnRef idx="2">
-            <a:schemeClr val="accent1">
-              <a:shade val="50000"/>
-            </a:schemeClr>
-          </a:lnRef>
-          <a:fillRef idx="1">
-            <a:schemeClr val="accent1"/>
-          </a:fillRef>
-          <a:effectRef idx="0">
-            <a:schemeClr val="accent1"/>
-          </a:effectRef>
-          <a:fontRef idx="minor">
-            <a:schemeClr val="lt1"/>
-          </a:fontRef>
-        </p:style>
-        <p:txBody>
-          <a:bodyPr lIns="0" tIns="0" rIns="0" bIns="0" rtlCol="0" anchor="ctr"/>
-          <a:lstStyle/>
-          <a:p>
-            <a:pPr algn="ctr"/>
-            <a:r>
-              <a:rPr lang="en-US" sz="800" dirty="0">
-                <a:latin typeface="Arial" panose="020B0604020202020204" pitchFamily="34" charset="0"/>
-                <a:cs typeface="Arial" panose="020B0604020202020204" pitchFamily="34" charset="0"/>
-              </a:rPr>
-              <a:t>3.2</a:t>
-            </a:r>
-          </a:p>
-        </p:txBody>
-      </p:sp>
-      <p:sp>
-        <p:nvSpPr>
-          <p:cNvPr id="99" name="Rectangle 98">
-            <a:extLst>
-              <a:ext uri="{FF2B5EF4-FFF2-40B4-BE49-F238E27FC236}">
-                <a16:creationId xmlns:a16="http://schemas.microsoft.com/office/drawing/2014/main" id="{4B2670A8-11CF-694C-B441-E690B7BB0CAA}"/>
-              </a:ext>
-            </a:extLst>
-          </p:cNvPr>
-          <p:cNvSpPr/>
-          <p:nvPr/>
-        </p:nvSpPr>
-        <p:spPr>
-          <a:xfrm>
-            <a:off x="9729842" y="4548521"/>
+            <a:off x="9780756" y="3100234"/>
             <a:ext cx="1236216" cy="1398732"/>
           </a:xfrm>
           <a:prstGeom prst="rect">
@@ -7894,7 +7203,7 @@
         </p:nvSpPr>
         <p:spPr>
           <a:xfrm>
-            <a:off x="9704307" y="5656660"/>
+            <a:off x="9755221" y="4208373"/>
             <a:ext cx="1387582" cy="261610"/>
           </a:xfrm>
           <a:prstGeom prst="rect">
@@ -7922,59 +7231,19 @@
       </p:sp>
       <p:sp>
         <p:nvSpPr>
-          <p:cNvPr id="121" name="TextBox 120">
-            <a:extLst>
-              <a:ext uri="{FF2B5EF4-FFF2-40B4-BE49-F238E27FC236}">
-                <a16:creationId xmlns:a16="http://schemas.microsoft.com/office/drawing/2014/main" id="{3253166B-0282-4B11-96AE-01345CE9FCD9}"/>
-              </a:ext>
-            </a:extLst>
-          </p:cNvPr>
-          <p:cNvSpPr txBox="1"/>
+          <p:cNvPr id="104" name="Oval 103">
+            <a:extLst>
+              <a:ext uri="{FF2B5EF4-FFF2-40B4-BE49-F238E27FC236}">
+                <a16:creationId xmlns:a16="http://schemas.microsoft.com/office/drawing/2014/main" id="{81719607-B241-6741-938B-3FC1408AF05E}"/>
+              </a:ext>
+            </a:extLst>
+          </p:cNvPr>
+          <p:cNvSpPr/>
           <p:nvPr/>
         </p:nvSpPr>
         <p:spPr>
           <a:xfrm>
-            <a:off x="9794642" y="2847283"/>
-            <a:ext cx="1387582" cy="261610"/>
-          </a:xfrm>
-          <a:prstGeom prst="rect">
-            <a:avLst/>
-          </a:prstGeom>
-          <a:noFill/>
-        </p:spPr>
-        <p:txBody>
-          <a:bodyPr wrap="square" rtlCol="0">
-            <a:spAutoFit/>
-          </a:bodyPr>
-          <a:lstStyle/>
-          <a:p>
-            <a:pPr algn="ctr"/>
-            <a:r>
-              <a:rPr lang="en-US" altLang="en-US" sz="1100" dirty="0">
-                <a:latin typeface="Arial" panose="020B0604020202020204" pitchFamily="34" charset="0"/>
-                <a:ea typeface="Amazon Ember" panose="020B0603020204020204" pitchFamily="34" charset="0"/>
-                <a:cs typeface="Arial" panose="020B0604020202020204" pitchFamily="34" charset="0"/>
-              </a:rPr>
-              <a:t>Shield Advanced</a:t>
-            </a:r>
-          </a:p>
-        </p:txBody>
-      </p:sp>
-      <p:sp>
-        <p:nvSpPr>
-          <p:cNvPr id="83" name="Oval 82">
-            <a:extLst>
-              <a:ext uri="{FF2B5EF4-FFF2-40B4-BE49-F238E27FC236}">
-                <a16:creationId xmlns:a16="http://schemas.microsoft.com/office/drawing/2014/main" id="{7FAA5BDA-59EE-924B-ACDA-6C50D7ABCDCD}"/>
-              </a:ext>
-            </a:extLst>
-          </p:cNvPr>
-          <p:cNvSpPr/>
-          <p:nvPr/>
-        </p:nvSpPr>
-        <p:spPr>
-          <a:xfrm>
-            <a:off x="10051691" y="2078861"/>
+            <a:off x="10266221" y="4019818"/>
             <a:ext cx="253435" cy="212902"/>
           </a:xfrm>
           <a:prstGeom prst="ellipse">
@@ -8020,12 +7289,255 @@
           </a:p>
         </p:txBody>
       </p:sp>
-      <p:sp>
-        <p:nvSpPr>
-          <p:cNvPr id="104" name="Oval 103">
-            <a:extLst>
-              <a:ext uri="{FF2B5EF4-FFF2-40B4-BE49-F238E27FC236}">
-                <a16:creationId xmlns:a16="http://schemas.microsoft.com/office/drawing/2014/main" id="{81719607-B241-6741-938B-3FC1408AF05E}"/>
+      <p:pic>
+        <p:nvPicPr>
+          <p:cNvPr id="8" name="Picture 7">
+            <a:extLst>
+              <a:ext uri="{FF2B5EF4-FFF2-40B4-BE49-F238E27FC236}">
+                <a16:creationId xmlns:a16="http://schemas.microsoft.com/office/drawing/2014/main" id="{5B2A8BB2-2AC9-4DBC-86E2-1B209053B3A2}"/>
+              </a:ext>
+            </a:extLst>
+          </p:cNvPr>
+          <p:cNvPicPr>
+            <a:picLocks noChangeAspect="1"/>
+          </p:cNvPicPr>
+          <p:nvPr/>
+        </p:nvPicPr>
+        <p:blipFill>
+          <a:blip r:embed="rId13"/>
+          <a:stretch>
+            <a:fillRect/>
+          </a:stretch>
+        </p:blipFill>
+        <p:spPr>
+          <a:xfrm>
+            <a:off x="2969897" y="3682300"/>
+            <a:ext cx="457201" cy="419878"/>
+          </a:xfrm>
+          <a:prstGeom prst="rect">
+            <a:avLst/>
+          </a:prstGeom>
+        </p:spPr>
+      </p:pic>
+      <p:cxnSp>
+        <p:nvCxnSpPr>
+          <p:cNvPr id="84" name="Straight Arrow Connector 83">
+            <a:extLst>
+              <a:ext uri="{FF2B5EF4-FFF2-40B4-BE49-F238E27FC236}">
+                <a16:creationId xmlns:a16="http://schemas.microsoft.com/office/drawing/2014/main" id="{25D0F1E8-5084-4285-8C93-40842C2A5322}"/>
+              </a:ext>
+            </a:extLst>
+          </p:cNvPr>
+          <p:cNvCxnSpPr>
+            <a:cxnSpLocks/>
+          </p:cNvCxnSpPr>
+          <p:nvPr/>
+        </p:nvCxnSpPr>
+        <p:spPr>
+          <a:xfrm flipV="1">
+            <a:off x="3499838" y="3094488"/>
+            <a:ext cx="867543" cy="555031"/>
+          </a:xfrm>
+          <a:prstGeom prst="straightConnector1">
+            <a:avLst/>
+          </a:prstGeom>
+          <a:ln>
+            <a:tailEnd type="triangle"/>
+          </a:ln>
+        </p:spPr>
+        <p:style>
+          <a:lnRef idx="1">
+            <a:schemeClr val="dk1"/>
+          </a:lnRef>
+          <a:fillRef idx="0">
+            <a:schemeClr val="dk1"/>
+          </a:fillRef>
+          <a:effectRef idx="0">
+            <a:schemeClr val="dk1"/>
+          </a:effectRef>
+          <a:fontRef idx="minor">
+            <a:schemeClr val="tx1"/>
+          </a:fontRef>
+        </p:style>
+      </p:cxnSp>
+      <p:sp>
+        <p:nvSpPr>
+          <p:cNvPr id="103" name="TextBox 26">
+            <a:extLst>
+              <a:ext uri="{FF2B5EF4-FFF2-40B4-BE49-F238E27FC236}">
+                <a16:creationId xmlns:a16="http://schemas.microsoft.com/office/drawing/2014/main" id="{F27CC0B2-1BF7-412E-B09A-3A403B50FFF1}"/>
+              </a:ext>
+            </a:extLst>
+          </p:cNvPr>
+          <p:cNvSpPr txBox="1">
+            <a:spLocks noChangeArrowheads="1"/>
+          </p:cNvSpPr>
+          <p:nvPr/>
+        </p:nvSpPr>
+        <p:spPr bwMode="auto">
+          <a:xfrm>
+            <a:off x="2675255" y="4059529"/>
+            <a:ext cx="969198" cy="430887"/>
+          </a:xfrm>
+          <a:prstGeom prst="rect">
+            <a:avLst/>
+          </a:prstGeom>
+          <a:noFill/>
+          <a:ln>
+            <a:noFill/>
+          </a:ln>
+          <a:extLst>
+            <a:ext uri="{909E8E84-426E-40DD-AFC4-6F175D3DCCD1}">
+              <a14:hiddenFill xmlns:a14="http://schemas.microsoft.com/office/drawing/2010/main">
+                <a:solidFill>
+                  <a:srgbClr val="FFFFFF"/>
+                </a:solidFill>
+              </a14:hiddenFill>
+            </a:ext>
+            <a:ext uri="{91240B29-F687-4F45-9708-019B960494DF}">
+              <a14:hiddenLine xmlns:a14="http://schemas.microsoft.com/office/drawing/2010/main" w="9525">
+                <a:solidFill>
+                  <a:srgbClr val="000000"/>
+                </a:solidFill>
+                <a:miter lim="800000"/>
+                <a:headEnd/>
+                <a:tailEnd/>
+              </a14:hiddenLine>
+            </a:ext>
+          </a:extLst>
+        </p:spPr>
+        <p:txBody>
+          <a:bodyPr wrap="square">
+            <a:spAutoFit/>
+          </a:bodyPr>
+          <a:lstStyle>
+            <a:lvl1pPr>
+              <a:defRPr>
+                <a:solidFill>
+                  <a:schemeClr val="tx1"/>
+                </a:solidFill>
+                <a:latin typeface="Calibri" panose="020F0502020204030204" pitchFamily="34" charset="0"/>
+              </a:defRPr>
+            </a:lvl1pPr>
+            <a:lvl2pPr marL="742950" indent="-285750">
+              <a:defRPr>
+                <a:solidFill>
+                  <a:schemeClr val="tx1"/>
+                </a:solidFill>
+                <a:latin typeface="Calibri" panose="020F0502020204030204" pitchFamily="34" charset="0"/>
+              </a:defRPr>
+            </a:lvl2pPr>
+            <a:lvl3pPr marL="1143000" indent="-228600">
+              <a:defRPr>
+                <a:solidFill>
+                  <a:schemeClr val="tx1"/>
+                </a:solidFill>
+                <a:latin typeface="Calibri" panose="020F0502020204030204" pitchFamily="34" charset="0"/>
+              </a:defRPr>
+            </a:lvl3pPr>
+            <a:lvl4pPr marL="1600200" indent="-228600">
+              <a:defRPr>
+                <a:solidFill>
+                  <a:schemeClr val="tx1"/>
+                </a:solidFill>
+                <a:latin typeface="Calibri" panose="020F0502020204030204" pitchFamily="34" charset="0"/>
+              </a:defRPr>
+            </a:lvl4pPr>
+            <a:lvl5pPr marL="2057400" indent="-228600">
+              <a:defRPr>
+                <a:solidFill>
+                  <a:schemeClr val="tx1"/>
+                </a:solidFill>
+                <a:latin typeface="Calibri" panose="020F0502020204030204" pitchFamily="34" charset="0"/>
+              </a:defRPr>
+            </a:lvl5pPr>
+            <a:lvl6pPr marL="2514600" indent="-228600" eaLnBrk="0" fontAlgn="base" hangingPunct="0">
+              <a:spcBef>
+                <a:spcPct val="0"/>
+              </a:spcBef>
+              <a:spcAft>
+                <a:spcPct val="0"/>
+              </a:spcAft>
+              <a:defRPr>
+                <a:solidFill>
+                  <a:schemeClr val="tx1"/>
+                </a:solidFill>
+                <a:latin typeface="Calibri" panose="020F0502020204030204" pitchFamily="34" charset="0"/>
+              </a:defRPr>
+            </a:lvl6pPr>
+            <a:lvl7pPr marL="2971800" indent="-228600" eaLnBrk="0" fontAlgn="base" hangingPunct="0">
+              <a:spcBef>
+                <a:spcPct val="0"/>
+              </a:spcBef>
+              <a:spcAft>
+                <a:spcPct val="0"/>
+              </a:spcAft>
+              <a:defRPr>
+                <a:solidFill>
+                  <a:schemeClr val="tx1"/>
+                </a:solidFill>
+                <a:latin typeface="Calibri" panose="020F0502020204030204" pitchFamily="34" charset="0"/>
+              </a:defRPr>
+            </a:lvl7pPr>
+            <a:lvl8pPr marL="3429000" indent="-228600" eaLnBrk="0" fontAlgn="base" hangingPunct="0">
+              <a:spcBef>
+                <a:spcPct val="0"/>
+              </a:spcBef>
+              <a:spcAft>
+                <a:spcPct val="0"/>
+              </a:spcAft>
+              <a:defRPr>
+                <a:solidFill>
+                  <a:schemeClr val="tx1"/>
+                </a:solidFill>
+                <a:latin typeface="Calibri" panose="020F0502020204030204" pitchFamily="34" charset="0"/>
+              </a:defRPr>
+            </a:lvl8pPr>
+            <a:lvl9pPr marL="3886200" indent="-228600" eaLnBrk="0" fontAlgn="base" hangingPunct="0">
+              <a:spcBef>
+                <a:spcPct val="0"/>
+              </a:spcBef>
+              <a:spcAft>
+                <a:spcPct val="0"/>
+              </a:spcAft>
+              <a:defRPr>
+                <a:solidFill>
+                  <a:schemeClr val="tx1"/>
+                </a:solidFill>
+                <a:latin typeface="Calibri" panose="020F0502020204030204" pitchFamily="34" charset="0"/>
+              </a:defRPr>
+            </a:lvl9pPr>
+          </a:lstStyle>
+          <a:p>
+            <a:pPr algn="ctr" eaLnBrk="1" hangingPunct="1"/>
+            <a:r>
+              <a:rPr lang="en-US" altLang="en-US" sz="1100" dirty="0">
+                <a:latin typeface="Arial" panose="020B0604020202020204" pitchFamily="34" charset="0"/>
+                <a:ea typeface="Amazon Ember" panose="020B0603020204020204" pitchFamily="34" charset="0"/>
+                <a:cs typeface="Arial" panose="020B0604020202020204" pitchFamily="34" charset="0"/>
+              </a:rPr>
+              <a:t>Lambda</a:t>
+            </a:r>
+          </a:p>
+          <a:p>
+            <a:pPr algn="ctr" eaLnBrk="1" hangingPunct="1"/>
+            <a:r>
+              <a:rPr lang="en-US" altLang="en-US" sz="1100" dirty="0">
+                <a:latin typeface="Arial" panose="020B0604020202020204" pitchFamily="34" charset="0"/>
+                <a:ea typeface="Amazon Ember" panose="020B0603020204020204" pitchFamily="34" charset="0"/>
+                <a:cs typeface="Arial" panose="020B0604020202020204" pitchFamily="34" charset="0"/>
+              </a:rPr>
+              <a:t>Layer</a:t>
+            </a:r>
+          </a:p>
+        </p:txBody>
+      </p:sp>
+      <p:sp>
+        <p:nvSpPr>
+          <p:cNvPr id="117" name="Oval 116">
+            <a:extLst>
+              <a:ext uri="{FF2B5EF4-FFF2-40B4-BE49-F238E27FC236}">
+                <a16:creationId xmlns:a16="http://schemas.microsoft.com/office/drawing/2014/main" id="{09C21C80-03E3-4FAE-8FF6-4549EE21E5CD}"/>
               </a:ext>
             </a:extLst>
           </p:cNvPr>
@@ -8034,8 +7546,8 @@
         </p:nvSpPr>
         <p:spPr>
           <a:xfrm>
-            <a:off x="10215307" y="5468105"/>
-            <a:ext cx="253435" cy="212902"/>
+            <a:off x="2661853" y="3759355"/>
+            <a:ext cx="300569" cy="204616"/>
           </a:xfrm>
           <a:prstGeom prst="ellipse">
             <a:avLst/>
@@ -8075,100 +7587,40 @@
                 <a:latin typeface="Arial" panose="020B0604020202020204" pitchFamily="34" charset="0"/>
                 <a:cs typeface="Arial" panose="020B0604020202020204" pitchFamily="34" charset="0"/>
               </a:rPr>
-              <a:t>3.3</a:t>
+              <a:t>1.12</a:t>
             </a:r>
           </a:p>
         </p:txBody>
       </p:sp>
       <p:pic>
         <p:nvPicPr>
-          <p:cNvPr id="8" name="Picture 7">
-            <a:extLst>
-              <a:ext uri="{FF2B5EF4-FFF2-40B4-BE49-F238E27FC236}">
-                <a16:creationId xmlns:a16="http://schemas.microsoft.com/office/drawing/2014/main" id="{5B2A8BB2-2AC9-4DBC-86E2-1B209053B3A2}"/>
+          <p:cNvPr id="6" name="Graphic 6" descr="AWS Shield Advanced resource icon for the AWS Shield service.">
+            <a:extLst>
+              <a:ext uri="{FF2B5EF4-FFF2-40B4-BE49-F238E27FC236}">
+                <a16:creationId xmlns:a16="http://schemas.microsoft.com/office/drawing/2014/main" id="{DE85F53E-D683-423C-0767-F7FA458E1451}"/>
               </a:ext>
             </a:extLst>
           </p:cNvPr>
           <p:cNvPicPr>
-            <a:picLocks noChangeAspect="1"/>
+            <a:picLocks noChangeAspect="1" noChangeArrowheads="1"/>
           </p:cNvPicPr>
           <p:nvPr/>
         </p:nvPicPr>
         <p:blipFill>
-          <a:blip r:embed="rId13"/>
-          <a:stretch>
-            <a:fillRect/>
-          </a:stretch>
+          <a:blip r:embed="rId14">
+            <a:extLst>
+              <a:ext uri="{96DAC541-7B7A-43D3-8B79-37D633B846F1}">
+                <asvg:svgBlip xmlns:asvg="http://schemas.microsoft.com/office/drawing/2016/SVG/main" r:embed="rId15"/>
+              </a:ext>
+            </a:extLst>
+          </a:blip>
+          <a:srcRect/>
+          <a:stretch/>
         </p:blipFill>
-        <p:spPr>
-          <a:xfrm>
-            <a:off x="2969897" y="3682300"/>
-            <a:ext cx="457201" cy="419878"/>
-          </a:xfrm>
-          <a:prstGeom prst="rect">
-            <a:avLst/>
-          </a:prstGeom>
-        </p:spPr>
-      </p:pic>
-      <p:cxnSp>
-        <p:nvCxnSpPr>
-          <p:cNvPr id="84" name="Straight Arrow Connector 83">
-            <a:extLst>
-              <a:ext uri="{FF2B5EF4-FFF2-40B4-BE49-F238E27FC236}">
-                <a16:creationId xmlns:a16="http://schemas.microsoft.com/office/drawing/2014/main" id="{25D0F1E8-5084-4285-8C93-40842C2A5322}"/>
-              </a:ext>
-            </a:extLst>
-          </p:cNvPr>
-          <p:cNvCxnSpPr>
-            <a:cxnSpLocks/>
-          </p:cNvCxnSpPr>
-          <p:nvPr/>
-        </p:nvCxnSpPr>
-        <p:spPr>
-          <a:xfrm flipV="1">
-            <a:off x="3499838" y="3094488"/>
-            <a:ext cx="867543" cy="555031"/>
-          </a:xfrm>
-          <a:prstGeom prst="straightConnector1">
-            <a:avLst/>
-          </a:prstGeom>
-          <a:ln>
-            <a:tailEnd type="triangle"/>
-          </a:ln>
-        </p:spPr>
-        <p:style>
-          <a:lnRef idx="1">
-            <a:schemeClr val="dk1"/>
-          </a:lnRef>
-          <a:fillRef idx="0">
-            <a:schemeClr val="dk1"/>
-          </a:fillRef>
-          <a:effectRef idx="0">
-            <a:schemeClr val="dk1"/>
-          </a:effectRef>
-          <a:fontRef idx="minor">
-            <a:schemeClr val="tx1"/>
-          </a:fontRef>
-        </p:style>
-      </p:cxnSp>
-      <p:sp>
-        <p:nvSpPr>
-          <p:cNvPr id="103" name="TextBox 26">
-            <a:extLst>
-              <a:ext uri="{FF2B5EF4-FFF2-40B4-BE49-F238E27FC236}">
-                <a16:creationId xmlns:a16="http://schemas.microsoft.com/office/drawing/2014/main" id="{F27CC0B2-1BF7-412E-B09A-3A403B50FFF1}"/>
-              </a:ext>
-            </a:extLst>
-          </p:cNvPr>
-          <p:cNvSpPr txBox="1">
-            <a:spLocks noChangeArrowheads="1"/>
-          </p:cNvSpPr>
-          <p:nvPr/>
-        </p:nvSpPr>
         <p:spPr bwMode="auto">
           <a:xfrm>
-            <a:off x="2675255" y="4059529"/>
-            <a:ext cx="969198" cy="430887"/>
+            <a:off x="6615060" y="2433041"/>
+            <a:ext cx="653400" cy="653400"/>
           </a:xfrm>
           <a:prstGeom prst="rect">
             <a:avLst/>
@@ -8197,198 +7649,13 @@
             </a:ext>
           </a:extLst>
         </p:spPr>
-        <p:txBody>
-          <a:bodyPr wrap="square">
-            <a:spAutoFit/>
-          </a:bodyPr>
-          <a:lstStyle>
-            <a:lvl1pPr>
-              <a:defRPr>
-                <a:solidFill>
-                  <a:schemeClr val="tx1"/>
-                </a:solidFill>
-                <a:latin typeface="Calibri" panose="020F0502020204030204" pitchFamily="34" charset="0"/>
-              </a:defRPr>
-            </a:lvl1pPr>
-            <a:lvl2pPr marL="742950" indent="-285750">
-              <a:defRPr>
-                <a:solidFill>
-                  <a:schemeClr val="tx1"/>
-                </a:solidFill>
-                <a:latin typeface="Calibri" panose="020F0502020204030204" pitchFamily="34" charset="0"/>
-              </a:defRPr>
-            </a:lvl2pPr>
-            <a:lvl3pPr marL="1143000" indent="-228600">
-              <a:defRPr>
-                <a:solidFill>
-                  <a:schemeClr val="tx1"/>
-                </a:solidFill>
-                <a:latin typeface="Calibri" panose="020F0502020204030204" pitchFamily="34" charset="0"/>
-              </a:defRPr>
-            </a:lvl3pPr>
-            <a:lvl4pPr marL="1600200" indent="-228600">
-              <a:defRPr>
-                <a:solidFill>
-                  <a:schemeClr val="tx1"/>
-                </a:solidFill>
-                <a:latin typeface="Calibri" panose="020F0502020204030204" pitchFamily="34" charset="0"/>
-              </a:defRPr>
-            </a:lvl4pPr>
-            <a:lvl5pPr marL="2057400" indent="-228600">
-              <a:defRPr>
-                <a:solidFill>
-                  <a:schemeClr val="tx1"/>
-                </a:solidFill>
-                <a:latin typeface="Calibri" panose="020F0502020204030204" pitchFamily="34" charset="0"/>
-              </a:defRPr>
-            </a:lvl5pPr>
-            <a:lvl6pPr marL="2514600" indent="-228600" eaLnBrk="0" fontAlgn="base" hangingPunct="0">
-              <a:spcBef>
-                <a:spcPct val="0"/>
-              </a:spcBef>
-              <a:spcAft>
-                <a:spcPct val="0"/>
-              </a:spcAft>
-              <a:defRPr>
-                <a:solidFill>
-                  <a:schemeClr val="tx1"/>
-                </a:solidFill>
-                <a:latin typeface="Calibri" panose="020F0502020204030204" pitchFamily="34" charset="0"/>
-              </a:defRPr>
-            </a:lvl6pPr>
-            <a:lvl7pPr marL="2971800" indent="-228600" eaLnBrk="0" fontAlgn="base" hangingPunct="0">
-              <a:spcBef>
-                <a:spcPct val="0"/>
-              </a:spcBef>
-              <a:spcAft>
-                <a:spcPct val="0"/>
-              </a:spcAft>
-              <a:defRPr>
-                <a:solidFill>
-                  <a:schemeClr val="tx1"/>
-                </a:solidFill>
-                <a:latin typeface="Calibri" panose="020F0502020204030204" pitchFamily="34" charset="0"/>
-              </a:defRPr>
-            </a:lvl7pPr>
-            <a:lvl8pPr marL="3429000" indent="-228600" eaLnBrk="0" fontAlgn="base" hangingPunct="0">
-              <a:spcBef>
-                <a:spcPct val="0"/>
-              </a:spcBef>
-              <a:spcAft>
-                <a:spcPct val="0"/>
-              </a:spcAft>
-              <a:defRPr>
-                <a:solidFill>
-                  <a:schemeClr val="tx1"/>
-                </a:solidFill>
-                <a:latin typeface="Calibri" panose="020F0502020204030204" pitchFamily="34" charset="0"/>
-              </a:defRPr>
-            </a:lvl8pPr>
-            <a:lvl9pPr marL="3886200" indent="-228600" eaLnBrk="0" fontAlgn="base" hangingPunct="0">
-              <a:spcBef>
-                <a:spcPct val="0"/>
-              </a:spcBef>
-              <a:spcAft>
-                <a:spcPct val="0"/>
-              </a:spcAft>
-              <a:defRPr>
-                <a:solidFill>
-                  <a:schemeClr val="tx1"/>
-                </a:solidFill>
-                <a:latin typeface="Calibri" panose="020F0502020204030204" pitchFamily="34" charset="0"/>
-              </a:defRPr>
-            </a:lvl9pPr>
-          </a:lstStyle>
-          <a:p>
-            <a:pPr algn="ctr" eaLnBrk="1" hangingPunct="1"/>
-            <a:r>
-              <a:rPr lang="en-US" altLang="en-US" sz="1100" dirty="0">
-                <a:latin typeface="Arial" panose="020B0604020202020204" pitchFamily="34" charset="0"/>
-                <a:ea typeface="Amazon Ember" panose="020B0603020204020204" pitchFamily="34" charset="0"/>
-                <a:cs typeface="Arial" panose="020B0604020202020204" pitchFamily="34" charset="0"/>
-              </a:rPr>
-              <a:t>Lambda</a:t>
-            </a:r>
-          </a:p>
-          <a:p>
-            <a:pPr algn="ctr" eaLnBrk="1" hangingPunct="1"/>
-            <a:r>
-              <a:rPr lang="en-US" altLang="en-US" sz="1100" dirty="0">
-                <a:latin typeface="Arial" panose="020B0604020202020204" pitchFamily="34" charset="0"/>
-                <a:ea typeface="Amazon Ember" panose="020B0603020204020204" pitchFamily="34" charset="0"/>
-                <a:cs typeface="Arial" panose="020B0604020202020204" pitchFamily="34" charset="0"/>
-              </a:rPr>
-              <a:t>Layer</a:t>
-            </a:r>
-          </a:p>
-        </p:txBody>
-      </p:sp>
-      <p:sp>
-        <p:nvSpPr>
-          <p:cNvPr id="117" name="Oval 116">
-            <a:extLst>
-              <a:ext uri="{FF2B5EF4-FFF2-40B4-BE49-F238E27FC236}">
-                <a16:creationId xmlns:a16="http://schemas.microsoft.com/office/drawing/2014/main" id="{09C21C80-03E3-4FAE-8FF6-4549EE21E5CD}"/>
-              </a:ext>
-            </a:extLst>
-          </p:cNvPr>
-          <p:cNvSpPr/>
-          <p:nvPr/>
-        </p:nvSpPr>
-        <p:spPr>
-          <a:xfrm>
-            <a:off x="2661853" y="3759355"/>
-            <a:ext cx="300569" cy="204616"/>
-          </a:xfrm>
-          <a:prstGeom prst="ellipse">
-            <a:avLst/>
-          </a:prstGeom>
-          <a:solidFill>
-            <a:schemeClr val="tx1"/>
-          </a:solidFill>
-          <a:ln>
-            <a:solidFill>
-              <a:schemeClr val="tx1"/>
-            </a:solidFill>
-          </a:ln>
-        </p:spPr>
-        <p:style>
-          <a:lnRef idx="2">
-            <a:schemeClr val="accent1">
-              <a:shade val="50000"/>
-            </a:schemeClr>
-          </a:lnRef>
-          <a:fillRef idx="1">
-            <a:schemeClr val="accent1"/>
-          </a:fillRef>
-          <a:effectRef idx="0">
-            <a:schemeClr val="accent1"/>
-          </a:effectRef>
-          <a:fontRef idx="minor">
-            <a:schemeClr val="lt1"/>
-          </a:fontRef>
-        </p:style>
-        <p:txBody>
-          <a:bodyPr lIns="0" tIns="0" rIns="0" bIns="0" rtlCol="0" anchor="ctr"/>
-          <a:lstStyle/>
-          <a:p>
-            <a:pPr algn="ctr"/>
-            <a:r>
-              <a:rPr lang="en-US" sz="800" dirty="0">
-                <a:latin typeface="Arial" panose="020B0604020202020204" pitchFamily="34" charset="0"/>
-                <a:cs typeface="Arial" panose="020B0604020202020204" pitchFamily="34" charset="0"/>
-              </a:rPr>
-              <a:t>1.12</a:t>
-            </a:r>
-          </a:p>
-        </p:txBody>
-      </p:sp>
+      </p:pic>
       <p:pic>
         <p:nvPicPr>
-          <p:cNvPr id="6" name="Graphic 6" descr="AWS Shield Advanced resource icon for the AWS Shield service.">
-            <a:extLst>
-              <a:ext uri="{FF2B5EF4-FFF2-40B4-BE49-F238E27FC236}">
-                <a16:creationId xmlns:a16="http://schemas.microsoft.com/office/drawing/2014/main" id="{DE85F53E-D683-423C-0767-F7FA458E1451}"/>
+          <p:cNvPr id="9" name="Graphic 6" descr="AWS Shield Advanced resource icon for the AWS Shield service.">
+            <a:extLst>
+              <a:ext uri="{FF2B5EF4-FFF2-40B4-BE49-F238E27FC236}">
+                <a16:creationId xmlns:a16="http://schemas.microsoft.com/office/drawing/2014/main" id="{CBE40E6F-F10A-2853-7B94-3FD795BE88B2}"/>
               </a:ext>
             </a:extLst>
           </p:cNvPr>
@@ -8410,123 +7677,7 @@
         </p:blipFill>
         <p:spPr bwMode="auto">
           <a:xfrm>
-            <a:off x="6615060" y="2433041"/>
-            <a:ext cx="653400" cy="653400"/>
-          </a:xfrm>
-          <a:prstGeom prst="rect">
-            <a:avLst/>
-          </a:prstGeom>
-          <a:noFill/>
-          <a:ln>
-            <a:noFill/>
-          </a:ln>
-          <a:extLst>
-            <a:ext uri="{909E8E84-426E-40DD-AFC4-6F175D3DCCD1}">
-              <a14:hiddenFill xmlns:a14="http://schemas.microsoft.com/office/drawing/2010/main">
-                <a:solidFill>
-                  <a:srgbClr val="FFFFFF"/>
-                </a:solidFill>
-              </a14:hiddenFill>
-            </a:ext>
-            <a:ext uri="{91240B29-F687-4F45-9708-019B960494DF}">
-              <a14:hiddenLine xmlns:a14="http://schemas.microsoft.com/office/drawing/2010/main" w="9525">
-                <a:solidFill>
-                  <a:srgbClr val="000000"/>
-                </a:solidFill>
-                <a:miter lim="800000"/>
-                <a:headEnd/>
-                <a:tailEnd/>
-              </a14:hiddenLine>
-            </a:ext>
-          </a:extLst>
-        </p:spPr>
-      </p:pic>
-      <p:pic>
-        <p:nvPicPr>
-          <p:cNvPr id="9" name="Graphic 6" descr="AWS Shield Advanced resource icon for the AWS Shield service.">
-            <a:extLst>
-              <a:ext uri="{FF2B5EF4-FFF2-40B4-BE49-F238E27FC236}">
-                <a16:creationId xmlns:a16="http://schemas.microsoft.com/office/drawing/2014/main" id="{CBE40E6F-F10A-2853-7B94-3FD795BE88B2}"/>
-              </a:ext>
-            </a:extLst>
-          </p:cNvPr>
-          <p:cNvPicPr>
-            <a:picLocks noChangeAspect="1" noChangeArrowheads="1"/>
-          </p:cNvPicPr>
-          <p:nvPr/>
-        </p:nvPicPr>
-        <p:blipFill>
-          <a:blip r:embed="rId14">
-            <a:extLst>
-              <a:ext uri="{96DAC541-7B7A-43D3-8B79-37D633B846F1}">
-                <asvg:svgBlip xmlns:asvg="http://schemas.microsoft.com/office/drawing/2016/SVG/main" r:embed="rId15"/>
-              </a:ext>
-            </a:extLst>
-          </a:blip>
-          <a:srcRect/>
-          <a:stretch/>
-        </p:blipFill>
-        <p:spPr bwMode="auto">
-          <a:xfrm>
-            <a:off x="10034061" y="4761376"/>
-            <a:ext cx="653400" cy="653400"/>
-          </a:xfrm>
-          <a:prstGeom prst="rect">
-            <a:avLst/>
-          </a:prstGeom>
-          <a:noFill/>
-          <a:ln>
-            <a:noFill/>
-          </a:ln>
-          <a:extLst>
-            <a:ext uri="{909E8E84-426E-40DD-AFC4-6F175D3DCCD1}">
-              <a14:hiddenFill xmlns:a14="http://schemas.microsoft.com/office/drawing/2010/main">
-                <a:solidFill>
-                  <a:srgbClr val="FFFFFF"/>
-                </a:solidFill>
-              </a14:hiddenFill>
-            </a:ext>
-            <a:ext uri="{91240B29-F687-4F45-9708-019B960494DF}">
-              <a14:hiddenLine xmlns:a14="http://schemas.microsoft.com/office/drawing/2010/main" w="9525">
-                <a:solidFill>
-                  <a:srgbClr val="000000"/>
-                </a:solidFill>
-                <a:miter lim="800000"/>
-                <a:headEnd/>
-                <a:tailEnd/>
-              </a14:hiddenLine>
-            </a:ext>
-          </a:extLst>
-        </p:spPr>
-      </p:pic>
-      <p:pic>
-        <p:nvPicPr>
-          <p:cNvPr id="10" name="Graphic 6" descr="AWS Shield Advanced resource icon for the AWS Shield service.">
-            <a:extLst>
-              <a:ext uri="{FF2B5EF4-FFF2-40B4-BE49-F238E27FC236}">
-                <a16:creationId xmlns:a16="http://schemas.microsoft.com/office/drawing/2014/main" id="{63550D1B-42A9-9502-76FF-6D6F2B2AE51C}"/>
-              </a:ext>
-            </a:extLst>
-          </p:cNvPr>
-          <p:cNvPicPr>
-            <a:picLocks noChangeAspect="1" noChangeArrowheads="1"/>
-          </p:cNvPicPr>
-          <p:nvPr/>
-        </p:nvPicPr>
-        <p:blipFill>
-          <a:blip r:embed="rId14">
-            <a:extLst>
-              <a:ext uri="{96DAC541-7B7A-43D3-8B79-37D633B846F1}">
-                <asvg:svgBlip xmlns:asvg="http://schemas.microsoft.com/office/drawing/2016/SVG/main" r:embed="rId15"/>
-              </a:ext>
-            </a:extLst>
-          </a:blip>
-          <a:srcRect/>
-          <a:stretch/>
-        </p:blipFill>
-        <p:spPr bwMode="auto">
-          <a:xfrm>
-            <a:off x="10163799" y="2205432"/>
+            <a:off x="10084975" y="3313089"/>
             <a:ext cx="653400" cy="653400"/>
           </a:xfrm>
           <a:prstGeom prst="rect">

</xml_diff>